<commit_message>
Arreglo de archivos: Acta y Backlog
</commit_message>
<xml_diff>
--- a/documetacionSoftware/1. Inicio/Planificación de Lanzamiento.pptx
+++ b/documetacionSoftware/1. Inicio/Planificación de Lanzamiento.pptx
@@ -133,6 +133,59 @@
 </p:presentation>
 </file>
 
+<file path=ppt/revisionInfo.xml><?xml version="1.0" encoding="utf-8"?>
+<p1510:revInfo xmlns:a="http://schemas.openxmlformats.org/drawingml/2006/main" xmlns:r="http://schemas.openxmlformats.org/officeDocument/2006/relationships" xmlns:p1510="http://schemas.microsoft.com/office/powerpoint/2015/10/main">
+  <p1510:revLst>
+    <p1510:client id="{F3921AEE-0818-DC00-28C8-554E1543DD53}" v="9" dt="2020-11-22T21:14:33.261"/>
+  </p1510:revLst>
+</p1510:revInfo>
+</file>
+
+<file path=ppt/changesInfos/changesInfo1.xml><?xml version="1.0" encoding="utf-8"?>
+<pc:chgInfo xmlns:a="http://schemas.openxmlformats.org/drawingml/2006/main" xmlns:r="http://schemas.openxmlformats.org/officeDocument/2006/relationships" xmlns:ac="http://schemas.microsoft.com/office/drawing/2013/main/command" xmlns:pc="http://schemas.microsoft.com/office/powerpoint/2013/main/command">
+  <pc:docChgLst>
+    <pc:chgData name="DAVID ANDRÉS PILLCO YARUQUI" userId="S::dapillco@utpl.edu.ec::629d2475-6180-49a1-bf25-75530ea74103" providerId="AD" clId="Web-{F3921AEE-0818-DC00-28C8-554E1543DD53}"/>
+    <pc:docChg chg="addSld modSld">
+      <pc:chgData name="DAVID ANDRÉS PILLCO YARUQUI" userId="S::dapillco@utpl.edu.ec::629d2475-6180-49a1-bf25-75530ea74103" providerId="AD" clId="Web-{F3921AEE-0818-DC00-28C8-554E1543DD53}" dt="2020-11-22T21:14:33.261" v="8" actId="1076"/>
+      <pc:docMkLst>
+        <pc:docMk/>
+      </pc:docMkLst>
+      <pc:sldChg chg="addSp delSp modSp new">
+        <pc:chgData name="DAVID ANDRÉS PILLCO YARUQUI" userId="S::dapillco@utpl.edu.ec::629d2475-6180-49a1-bf25-75530ea74103" providerId="AD" clId="Web-{F3921AEE-0818-DC00-28C8-554E1543DD53}" dt="2020-11-22T21:14:33.261" v="8" actId="1076"/>
+        <pc:sldMkLst>
+          <pc:docMk/>
+          <pc:sldMk cId="2326040714" sldId="279"/>
+        </pc:sldMkLst>
+        <pc:spChg chg="del">
+          <ac:chgData name="DAVID ANDRÉS PILLCO YARUQUI" userId="S::dapillco@utpl.edu.ec::629d2475-6180-49a1-bf25-75530ea74103" providerId="AD" clId="Web-{F3921AEE-0818-DC00-28C8-554E1543DD53}" dt="2020-11-22T21:13:54.057" v="1"/>
+          <ac:spMkLst>
+            <pc:docMk/>
+            <pc:sldMk cId="2326040714" sldId="279"/>
+            <ac:spMk id="2" creationId="{160532B0-6360-4DDB-A598-18DD48D9CFFC}"/>
+          </ac:spMkLst>
+        </pc:spChg>
+        <pc:spChg chg="del">
+          <ac:chgData name="DAVID ANDRÉS PILLCO YARUQUI" userId="S::dapillco@utpl.edu.ec::629d2475-6180-49a1-bf25-75530ea74103" providerId="AD" clId="Web-{F3921AEE-0818-DC00-28C8-554E1543DD53}" dt="2020-11-22T21:13:55.276" v="2"/>
+          <ac:spMkLst>
+            <pc:docMk/>
+            <pc:sldMk cId="2326040714" sldId="279"/>
+            <ac:spMk id="3" creationId="{A80E8E97-15EE-48C1-B6A8-59E54A822CFC}"/>
+          </ac:spMkLst>
+        </pc:spChg>
+        <pc:picChg chg="add mod">
+          <ac:chgData name="DAVID ANDRÉS PILLCO YARUQUI" userId="S::dapillco@utpl.edu.ec::629d2475-6180-49a1-bf25-75530ea74103" providerId="AD" clId="Web-{F3921AEE-0818-DC00-28C8-554E1543DD53}" dt="2020-11-22T21:14:33.261" v="8" actId="1076"/>
+          <ac:picMkLst>
+            <pc:docMk/>
+            <pc:sldMk cId="2326040714" sldId="279"/>
+            <ac:picMk id="4" creationId="{55E46C73-5238-43A7-BC6D-7211B9D5E39E}"/>
+          </ac:picMkLst>
+        </pc:picChg>
+      </pc:sldChg>
+    </pc:docChg>
+  </pc:docChgLst>
+</pc:chgInfo>
+</file>
+
 <file path=ppt/handoutMasters/handoutMaster1.xml><?xml version="1.0" encoding="utf-8"?>
 <p:handoutMaster xmlns:a="http://schemas.openxmlformats.org/drawingml/2006/main" xmlns:r="http://schemas.openxmlformats.org/officeDocument/2006/relationships" xmlns:p="http://schemas.openxmlformats.org/presentationml/2006/main">
   <p:cSld>
@@ -183,7 +236,7 @@
           </a:lstStyle>
           <a:p>
             <a:pPr rtl="0"/>
-            <a:endParaRPr lang="es-ES" dirty="0"/>
+            <a:endParaRPr lang="es-ES"/>
           </a:p>
         </p:txBody>
       </p:sp>
@@ -217,9 +270,9 @@
             <a:pPr rtl="0"/>
             <a:fld id="{F7263291-AF9B-40AC-86FB-A4BC679DE9B1}" type="datetime1">
               <a:rPr lang="es-ES" smtClean="0"/>
-              <a:t>24/09/2018</a:t>
+              <a:t>24/11/2020</a:t>
             </a:fld>
-            <a:endParaRPr lang="es-ES" dirty="0"/>
+            <a:endParaRPr lang="es-ES"/>
           </a:p>
         </p:txBody>
       </p:sp>
@@ -251,7 +304,7 @@
           </a:lstStyle>
           <a:p>
             <a:pPr rtl="0"/>
-            <a:endParaRPr lang="es-ES" dirty="0"/>
+            <a:endParaRPr lang="es-ES"/>
           </a:p>
         </p:txBody>
       </p:sp>
@@ -287,7 +340,7 @@
               <a:rPr lang="es-ES" smtClean="0"/>
               <a:t>‹Nº›</a:t>
             </a:fld>
-            <a:endParaRPr lang="es-ES" dirty="0"/>
+            <a:endParaRPr lang="es-ES"/>
           </a:p>
         </p:txBody>
       </p:sp>
@@ -353,7 +406,7 @@
           </a:lstStyle>
           <a:p>
             <a:pPr rtl="0"/>
-            <a:endParaRPr lang="es-ES" noProof="0" dirty="0"/>
+            <a:endParaRPr lang="es-ES" noProof="0"/>
           </a:p>
         </p:txBody>
       </p:sp>
@@ -387,9 +440,9 @@
             <a:pPr rtl="0"/>
             <a:fld id="{D37F807C-0218-4A41-8347-EABE14BBB239}" type="datetime1">
               <a:rPr lang="es-ES" noProof="0" smtClean="0"/>
-              <a:t>24/09/2018</a:t>
+              <a:t>24/11/2020</a:t>
             </a:fld>
-            <a:endParaRPr lang="es-ES" noProof="0" dirty="0"/>
+            <a:endParaRPr lang="es-ES" noProof="0"/>
           </a:p>
         </p:txBody>
       </p:sp>
@@ -423,7 +476,7 @@
           <a:lstStyle/>
           <a:p>
             <a:pPr rtl="0"/>
-            <a:endParaRPr lang="es-ES" noProof="0" dirty="0"/>
+            <a:endParaRPr lang="es-ES" noProof="0"/>
           </a:p>
         </p:txBody>
       </p:sp>
@@ -452,38 +505,37 @@
           <a:p>
             <a:pPr lvl="0" rtl="0"/>
             <a:r>
-              <a:rPr lang="es-ES" noProof="0" dirty="0" smtClean="0"/>
+              <a:rPr lang="es-ES" noProof="0"/>
               <a:t>Haga clic para modificar los estilos de texto del patrón</a:t>
             </a:r>
           </a:p>
           <a:p>
             <a:pPr lvl="1" rtl="0"/>
             <a:r>
-              <a:rPr lang="es-ES" noProof="0" dirty="0" smtClean="0"/>
+              <a:rPr lang="es-ES" noProof="0"/>
               <a:t>Segundo nivel</a:t>
             </a:r>
           </a:p>
           <a:p>
             <a:pPr lvl="2" rtl="0"/>
             <a:r>
-              <a:rPr lang="es-ES" noProof="0" dirty="0" smtClean="0"/>
+              <a:rPr lang="es-ES" noProof="0"/>
               <a:t>Tercer nivel</a:t>
             </a:r>
           </a:p>
           <a:p>
             <a:pPr lvl="3" rtl="0"/>
             <a:r>
-              <a:rPr lang="es-ES" noProof="0" dirty="0" smtClean="0"/>
+              <a:rPr lang="es-ES" noProof="0"/>
               <a:t>Cuarto nivel</a:t>
             </a:r>
           </a:p>
           <a:p>
             <a:pPr lvl="4" rtl="0"/>
             <a:r>
-              <a:rPr lang="es-ES" noProof="0" dirty="0" smtClean="0"/>
+              <a:rPr lang="es-ES" noProof="0"/>
               <a:t>Quinto nivel</a:t>
             </a:r>
-            <a:endParaRPr lang="es-ES" noProof="0" dirty="0"/>
           </a:p>
         </p:txBody>
       </p:sp>
@@ -515,7 +567,7 @@
           </a:lstStyle>
           <a:p>
             <a:pPr rtl="0"/>
-            <a:endParaRPr lang="es-ES" noProof="0" dirty="0"/>
+            <a:endParaRPr lang="es-ES" noProof="0"/>
           </a:p>
         </p:txBody>
       </p:sp>
@@ -551,7 +603,7 @@
               <a:rPr lang="es-ES" noProof="0" smtClean="0"/>
               <a:t>‹Nº›</a:t>
             </a:fld>
-            <a:endParaRPr lang="es-ES" noProof="0" dirty="0"/>
+            <a:endParaRPr lang="es-ES" noProof="0"/>
           </a:p>
         </p:txBody>
       </p:sp>
@@ -703,10 +755,10 @@
           </a:lstStyle>
           <a:p>
             <a:r>
-              <a:rPr lang="es-ES" smtClean="0"/>
+              <a:rPr lang="es-ES"/>
               <a:t>Haga clic para modificar el estilo de título del patrón</a:t>
             </a:r>
-            <a:endParaRPr lang="en-US" dirty="0"/>
+            <a:endParaRPr lang="en-US"/>
           </a:p>
         </p:txBody>
       </p:sp>
@@ -777,10 +829,10 @@
           </a:lstStyle>
           <a:p>
             <a:r>
-              <a:rPr lang="es-ES" smtClean="0"/>
+              <a:rPr lang="es-ES"/>
               <a:t>Haga clic para modificar el estilo de subtítulo del patrón</a:t>
             </a:r>
-            <a:endParaRPr lang="en-US" dirty="0"/>
+            <a:endParaRPr lang="en-US"/>
           </a:p>
         </p:txBody>
       </p:sp>
@@ -801,7 +853,7 @@
           <a:p>
             <a:fld id="{73CCA2E9-F8B7-4F9B-8722-72902CC82746}" type="datetimeFigureOut">
               <a:rPr lang="es-PA" smtClean="0"/>
-              <a:t>09/24/2018</a:t>
+              <a:t>11/24/2020</a:t>
             </a:fld>
             <a:endParaRPr lang="es-PA"/>
           </a:p>
@@ -2725,13 +2777,6 @@
       </p:transition>
     </mc:Fallback>
   </mc:AlternateContent>
-  <p:timing>
-    <p:tnLst>
-      <p:par>
-        <p:cTn id="1" dur="indefinite" restart="never" nodeType="tmRoot"/>
-      </p:par>
-    </p:tnLst>
-  </p:timing>
 </p:sldLayout>
 </file>
 
@@ -2768,7 +2813,7 @@
           <a:lstStyle/>
           <a:p>
             <a:r>
-              <a:rPr lang="es-ES" smtClean="0"/>
+              <a:rPr lang="es-ES"/>
               <a:t>Haga clic para modificar el estilo de título del patrón</a:t>
             </a:r>
             <a:endParaRPr lang="en-US"/>
@@ -2792,38 +2837,38 @@
           <a:p>
             <a:pPr lvl="0"/>
             <a:r>
-              <a:rPr lang="es-ES" smtClean="0"/>
+              <a:rPr lang="es-ES"/>
               <a:t>Haga clic para modificar el estilo de texto del patrón</a:t>
             </a:r>
           </a:p>
           <a:p>
             <a:pPr lvl="1"/>
             <a:r>
-              <a:rPr lang="es-ES" smtClean="0"/>
+              <a:rPr lang="es-ES"/>
               <a:t>Segundo nivel</a:t>
             </a:r>
           </a:p>
           <a:p>
             <a:pPr lvl="2"/>
             <a:r>
-              <a:rPr lang="es-ES" smtClean="0"/>
+              <a:rPr lang="es-ES"/>
               <a:t>Tercer nivel</a:t>
             </a:r>
           </a:p>
           <a:p>
             <a:pPr lvl="3"/>
             <a:r>
-              <a:rPr lang="es-ES" smtClean="0"/>
+              <a:rPr lang="es-ES"/>
               <a:t>Cuarto nivel</a:t>
             </a:r>
           </a:p>
           <a:p>
             <a:pPr lvl="4"/>
             <a:r>
-              <a:rPr lang="es-ES" smtClean="0"/>
+              <a:rPr lang="es-ES"/>
               <a:t>Quinto nivel</a:t>
             </a:r>
-            <a:endParaRPr lang="en-US" dirty="0"/>
+            <a:endParaRPr lang="en-US"/>
           </a:p>
         </p:txBody>
       </p:sp>
@@ -2844,7 +2889,7 @@
           <a:p>
             <a:fld id="{73CCA2E9-F8B7-4F9B-8722-72902CC82746}" type="datetimeFigureOut">
               <a:rPr lang="es-PA" smtClean="0"/>
-              <a:t>09/24/2018</a:t>
+              <a:t>11/24/2020</a:t>
             </a:fld>
             <a:endParaRPr lang="es-PA"/>
           </a:p>
@@ -2914,13 +2959,6 @@
       </p:transition>
     </mc:Fallback>
   </mc:AlternateContent>
-  <p:timing>
-    <p:tnLst>
-      <p:par>
-        <p:cTn id="1" dur="indefinite" restart="never" nodeType="tmRoot"/>
-      </p:par>
-    </p:tnLst>
-  </p:timing>
 </p:sldLayout>
 </file>
 
@@ -2962,7 +3000,7 @@
           <a:lstStyle/>
           <a:p>
             <a:r>
-              <a:rPr lang="es-ES" smtClean="0"/>
+              <a:rPr lang="es-ES"/>
               <a:t>Haga clic para modificar el estilo de título del patrón</a:t>
             </a:r>
             <a:endParaRPr lang="en-US"/>
@@ -2991,35 +3029,35 @@
           <a:p>
             <a:pPr lvl="0"/>
             <a:r>
-              <a:rPr lang="es-ES" smtClean="0"/>
+              <a:rPr lang="es-ES"/>
               <a:t>Haga clic para modificar el estilo de texto del patrón</a:t>
             </a:r>
           </a:p>
           <a:p>
             <a:pPr lvl="1"/>
             <a:r>
-              <a:rPr lang="es-ES" smtClean="0"/>
+              <a:rPr lang="es-ES"/>
               <a:t>Segundo nivel</a:t>
             </a:r>
           </a:p>
           <a:p>
             <a:pPr lvl="2"/>
             <a:r>
-              <a:rPr lang="es-ES" smtClean="0"/>
+              <a:rPr lang="es-ES"/>
               <a:t>Tercer nivel</a:t>
             </a:r>
           </a:p>
           <a:p>
             <a:pPr lvl="3"/>
             <a:r>
-              <a:rPr lang="es-ES" smtClean="0"/>
+              <a:rPr lang="es-ES"/>
               <a:t>Cuarto nivel</a:t>
             </a:r>
           </a:p>
           <a:p>
             <a:pPr lvl="4"/>
             <a:r>
-              <a:rPr lang="es-ES" smtClean="0"/>
+              <a:rPr lang="es-ES"/>
               <a:t>Quinto nivel</a:t>
             </a:r>
             <a:endParaRPr lang="en-US"/>
@@ -3043,7 +3081,7 @@
           <a:p>
             <a:fld id="{73CCA2E9-F8B7-4F9B-8722-72902CC82746}" type="datetimeFigureOut">
               <a:rPr lang="es-PA" smtClean="0"/>
-              <a:t>09/24/2018</a:t>
+              <a:t>11/24/2020</a:t>
             </a:fld>
             <a:endParaRPr lang="es-PA"/>
           </a:p>
@@ -3113,13 +3151,6 @@
       </p:transition>
     </mc:Fallback>
   </mc:AlternateContent>
-  <p:timing>
-    <p:tnLst>
-      <p:par>
-        <p:cTn id="1" dur="indefinite" restart="never" nodeType="tmRoot"/>
-      </p:par>
-    </p:tnLst>
-  </p:timing>
 </p:sldLayout>
 </file>
 
@@ -3167,10 +3198,10 @@
           </a:lstStyle>
           <a:p>
             <a:r>
-              <a:rPr lang="es-ES" smtClean="0"/>
+              <a:rPr lang="es-ES"/>
               <a:t>Haga clic para modificar el estilo de título del patrón</a:t>
             </a:r>
-            <a:endParaRPr lang="en-US" dirty="0"/>
+            <a:endParaRPr lang="en-US"/>
           </a:p>
         </p:txBody>
       </p:sp>
@@ -3241,10 +3272,10 @@
           </a:lstStyle>
           <a:p>
             <a:r>
-              <a:rPr lang="es-ES" smtClean="0"/>
+              <a:rPr lang="es-ES"/>
               <a:t>Haga clic para modificar el estilo de subtítulo del patrón</a:t>
             </a:r>
-            <a:endParaRPr lang="en-US" dirty="0"/>
+            <a:endParaRPr lang="en-US"/>
           </a:p>
         </p:txBody>
       </p:sp>
@@ -3265,7 +3296,7 @@
           <a:p>
             <a:fld id="{73CCA2E9-F8B7-4F9B-8722-72902CC82746}" type="datetimeFigureOut">
               <a:rPr lang="es-PA" smtClean="0"/>
-              <a:t>09/24/2018</a:t>
+              <a:t>11/24/2020</a:t>
             </a:fld>
             <a:endParaRPr lang="es-PA"/>
           </a:p>
@@ -5189,13 +5220,6 @@
       </p:transition>
     </mc:Fallback>
   </mc:AlternateContent>
-  <p:timing>
-    <p:tnLst>
-      <p:par>
-        <p:cTn id="1" dur="indefinite" restart="never" nodeType="tmRoot"/>
-      </p:par>
-    </p:tnLst>
-  </p:timing>
 </p:sldLayout>
 </file>
 
@@ -5232,10 +5256,10 @@
           <a:lstStyle/>
           <a:p>
             <a:r>
-              <a:rPr lang="es-ES" smtClean="0"/>
+              <a:rPr lang="es-ES"/>
               <a:t>Haga clic para modificar el estilo de título del patrón</a:t>
             </a:r>
-            <a:endParaRPr lang="en-US" dirty="0"/>
+            <a:endParaRPr lang="en-US"/>
           </a:p>
         </p:txBody>
       </p:sp>
@@ -5256,38 +5280,38 @@
           <a:p>
             <a:pPr lvl="0"/>
             <a:r>
-              <a:rPr lang="es-ES" smtClean="0"/>
+              <a:rPr lang="es-ES"/>
               <a:t>Haga clic para modificar el estilo de texto del patrón</a:t>
             </a:r>
           </a:p>
           <a:p>
             <a:pPr lvl="1"/>
             <a:r>
-              <a:rPr lang="es-ES" smtClean="0"/>
+              <a:rPr lang="es-ES"/>
               <a:t>Segundo nivel</a:t>
             </a:r>
           </a:p>
           <a:p>
             <a:pPr lvl="2"/>
             <a:r>
-              <a:rPr lang="es-ES" smtClean="0"/>
+              <a:rPr lang="es-ES"/>
               <a:t>Tercer nivel</a:t>
             </a:r>
           </a:p>
           <a:p>
             <a:pPr lvl="3"/>
             <a:r>
-              <a:rPr lang="es-ES" smtClean="0"/>
+              <a:rPr lang="es-ES"/>
               <a:t>Cuarto nivel</a:t>
             </a:r>
           </a:p>
           <a:p>
             <a:pPr lvl="4"/>
             <a:r>
-              <a:rPr lang="es-ES" smtClean="0"/>
+              <a:rPr lang="es-ES"/>
               <a:t>Quinto nivel</a:t>
             </a:r>
-            <a:endParaRPr lang="en-US" dirty="0"/>
+            <a:endParaRPr lang="en-US"/>
           </a:p>
         </p:txBody>
       </p:sp>
@@ -5309,9 +5333,9 @@
             <a:pPr rtl="0"/>
             <a:fld id="{53653A19-589A-4045-A0A7-A0896C41DFBA}" type="datetime1">
               <a:rPr lang="es-ES" noProof="0" smtClean="0"/>
-              <a:t>24/09/2018</a:t>
+              <a:t>24/11/2020</a:t>
             </a:fld>
-            <a:endParaRPr lang="es-ES" noProof="0" dirty="0"/>
+            <a:endParaRPr lang="es-ES" noProof="0"/>
           </a:p>
         </p:txBody>
       </p:sp>
@@ -5332,10 +5356,9 @@
           <a:p>
             <a:pPr rtl="0"/>
             <a:r>
-              <a:rPr lang="es-ES" noProof="0" smtClean="0"/>
+              <a:rPr lang="es-ES" noProof="0"/>
               <a:t>Agregar un pie de página</a:t>
             </a:r>
-            <a:endParaRPr lang="es-ES" noProof="0" dirty="0"/>
           </a:p>
         </p:txBody>
       </p:sp>
@@ -5360,7 +5383,7 @@
               <a:pPr rtl="0"/>
               <a:t>‹Nº›</a:t>
             </a:fld>
-            <a:endParaRPr lang="es-ES" noProof="0" dirty="0"/>
+            <a:endParaRPr lang="es-ES" noProof="0"/>
           </a:p>
         </p:txBody>
       </p:sp>
@@ -5374,13 +5397,6 @@
   <p:clrMapOvr>
     <a:masterClrMapping/>
   </p:clrMapOvr>
-  <p:timing>
-    <p:tnLst>
-      <p:par>
-        <p:cTn id="1" dur="indefinite" restart="never" nodeType="tmRoot"/>
-      </p:par>
-    </p:tnLst>
-  </p:timing>
   <p:hf sldNum="0" hdr="0" ftr="0" dt="0"/>
 </p:sldLayout>
 </file>
@@ -5429,10 +5445,10 @@
           </a:lstStyle>
           <a:p>
             <a:r>
-              <a:rPr lang="es-ES" smtClean="0"/>
+              <a:rPr lang="es-ES"/>
               <a:t>Haga clic para modificar el estilo de título del patrón</a:t>
             </a:r>
-            <a:endParaRPr lang="en-US" dirty="0"/>
+            <a:endParaRPr lang="en-US"/>
           </a:p>
         </p:txBody>
       </p:sp>
@@ -5552,7 +5568,7 @@
           <a:p>
             <a:pPr lvl="0"/>
             <a:r>
-              <a:rPr lang="es-ES" smtClean="0"/>
+              <a:rPr lang="es-ES"/>
               <a:t>Haga clic para modificar el estilo de texto del patrón</a:t>
             </a:r>
           </a:p>
@@ -5575,7 +5591,7 @@
           <a:p>
             <a:fld id="{73CCA2E9-F8B7-4F9B-8722-72902CC82746}" type="datetimeFigureOut">
               <a:rPr lang="es-PA" smtClean="0"/>
-              <a:t>09/24/2018</a:t>
+              <a:t>11/24/2020</a:t>
             </a:fld>
             <a:endParaRPr lang="es-PA"/>
           </a:p>
@@ -7503,13 +7519,6 @@
       </p:transition>
     </mc:Fallback>
   </mc:AlternateContent>
-  <p:timing>
-    <p:tnLst>
-      <p:par>
-        <p:cTn id="1" dur="indefinite" restart="never" nodeType="tmRoot"/>
-      </p:par>
-    </p:tnLst>
-  </p:timing>
 </p:sldLayout>
 </file>
 
@@ -7546,10 +7555,10 @@
           <a:lstStyle/>
           <a:p>
             <a:r>
-              <a:rPr lang="es-ES" smtClean="0"/>
+              <a:rPr lang="es-ES"/>
               <a:t>Haga clic para modificar el estilo de título del patrón</a:t>
             </a:r>
-            <a:endParaRPr lang="en-US" dirty="0"/>
+            <a:endParaRPr lang="en-US"/>
           </a:p>
         </p:txBody>
       </p:sp>
@@ -7575,38 +7584,38 @@
           <a:p>
             <a:pPr lvl="0"/>
             <a:r>
-              <a:rPr lang="es-ES" smtClean="0"/>
+              <a:rPr lang="es-ES"/>
               <a:t>Haga clic para modificar el estilo de texto del patrón</a:t>
             </a:r>
           </a:p>
           <a:p>
             <a:pPr lvl="1"/>
             <a:r>
-              <a:rPr lang="es-ES" smtClean="0"/>
+              <a:rPr lang="es-ES"/>
               <a:t>Segundo nivel</a:t>
             </a:r>
           </a:p>
           <a:p>
             <a:pPr lvl="2"/>
             <a:r>
-              <a:rPr lang="es-ES" smtClean="0"/>
+              <a:rPr lang="es-ES"/>
               <a:t>Tercer nivel</a:t>
             </a:r>
           </a:p>
           <a:p>
             <a:pPr lvl="3"/>
             <a:r>
-              <a:rPr lang="es-ES" smtClean="0"/>
+              <a:rPr lang="es-ES"/>
               <a:t>Cuarto nivel</a:t>
             </a:r>
           </a:p>
           <a:p>
             <a:pPr lvl="4"/>
             <a:r>
-              <a:rPr lang="es-ES" smtClean="0"/>
+              <a:rPr lang="es-ES"/>
               <a:t>Quinto nivel</a:t>
             </a:r>
-            <a:endParaRPr lang="en-US" dirty="0"/>
+            <a:endParaRPr lang="en-US"/>
           </a:p>
         </p:txBody>
       </p:sp>
@@ -7632,38 +7641,38 @@
           <a:p>
             <a:pPr lvl="0"/>
             <a:r>
-              <a:rPr lang="es-ES" smtClean="0"/>
+              <a:rPr lang="es-ES"/>
               <a:t>Haga clic para modificar el estilo de texto del patrón</a:t>
             </a:r>
           </a:p>
           <a:p>
             <a:pPr lvl="1"/>
             <a:r>
-              <a:rPr lang="es-ES" smtClean="0"/>
+              <a:rPr lang="es-ES"/>
               <a:t>Segundo nivel</a:t>
             </a:r>
           </a:p>
           <a:p>
             <a:pPr lvl="2"/>
             <a:r>
-              <a:rPr lang="es-ES" smtClean="0"/>
+              <a:rPr lang="es-ES"/>
               <a:t>Tercer nivel</a:t>
             </a:r>
           </a:p>
           <a:p>
             <a:pPr lvl="3"/>
             <a:r>
-              <a:rPr lang="es-ES" smtClean="0"/>
+              <a:rPr lang="es-ES"/>
               <a:t>Cuarto nivel</a:t>
             </a:r>
           </a:p>
           <a:p>
             <a:pPr lvl="4"/>
             <a:r>
-              <a:rPr lang="es-ES" smtClean="0"/>
+              <a:rPr lang="es-ES"/>
               <a:t>Quinto nivel</a:t>
             </a:r>
-            <a:endParaRPr lang="en-US" dirty="0"/>
+            <a:endParaRPr lang="en-US"/>
           </a:p>
         </p:txBody>
       </p:sp>
@@ -7684,7 +7693,7 @@
           <a:p>
             <a:fld id="{73CCA2E9-F8B7-4F9B-8722-72902CC82746}" type="datetimeFigureOut">
               <a:rPr lang="es-PA" smtClean="0"/>
-              <a:t>09/24/2018</a:t>
+              <a:t>11/24/2020</a:t>
             </a:fld>
             <a:endParaRPr lang="es-PA"/>
           </a:p>
@@ -7775,7 +7784,7 @@
           <a:p>
             <a:pPr algn="ctr"/>
             <a:r>
-              <a:rPr lang="es-ES" sz="1600" dirty="0" smtClean="0">
+              <a:rPr lang="es-ES" sz="1600">
                 <a:solidFill>
                   <a:schemeClr val="accent1"/>
                 </a:solidFill>
@@ -7784,13 +7793,6 @@
               </a:rPr>
               <a:t>SCRUM Práctico en Proyectos de Desarrollo de Software</a:t>
             </a:r>
-            <a:endParaRPr lang="es-ES" sz="1600" dirty="0">
-              <a:solidFill>
-                <a:schemeClr val="accent1"/>
-              </a:solidFill>
-              <a:latin typeface="Calibri Light" panose="020F0302020204030204" pitchFamily="34" charset="0"/>
-              <a:cs typeface="Calibri Light" panose="020F0302020204030204" pitchFamily="34" charset="0"/>
-            </a:endParaRPr>
           </a:p>
         </p:txBody>
       </p:sp>
@@ -7839,7 +7841,7 @@
           <a:p>
             <a:pPr algn="ctr"/>
             <a:r>
-              <a:rPr lang="es-ES" sz="1600" dirty="0" err="1" smtClean="0">
+              <a:rPr lang="es-ES" sz="1600" err="1">
                 <a:solidFill>
                   <a:schemeClr val="accent1"/>
                 </a:solidFill>
@@ -7849,7 +7851,7 @@
               <a:t>Udemy</a:t>
             </a:r>
             <a:r>
-              <a:rPr lang="es-ES" sz="1600" dirty="0" smtClean="0">
+              <a:rPr lang="es-ES" sz="1600">
                 <a:solidFill>
                   <a:schemeClr val="accent1"/>
                 </a:solidFill>
@@ -7858,13 +7860,6 @@
               </a:rPr>
               <a:t> – Héctor Bravo</a:t>
             </a:r>
-            <a:endParaRPr lang="es-ES" sz="1600" dirty="0">
-              <a:solidFill>
-                <a:schemeClr val="accent1"/>
-              </a:solidFill>
-              <a:latin typeface="Calibri Light" panose="020F0302020204030204" pitchFamily="34" charset="0"/>
-              <a:cs typeface="Calibri Light" panose="020F0302020204030204" pitchFamily="34" charset="0"/>
-            </a:endParaRPr>
           </a:p>
         </p:txBody>
       </p:sp>
@@ -7890,13 +7885,6 @@
       </p:transition>
     </mc:Fallback>
   </mc:AlternateContent>
-  <p:timing>
-    <p:tnLst>
-      <p:par>
-        <p:cTn id="1" dur="indefinite" restart="never" nodeType="tmRoot"/>
-      </p:par>
-    </p:tnLst>
-  </p:timing>
 </p:sldLayout>
 </file>
 
@@ -7981,7 +7969,7 @@
           <a:p>
             <a:pPr lvl="0"/>
             <a:r>
-              <a:rPr lang="es-ES" smtClean="0"/>
+              <a:rPr lang="es-ES"/>
               <a:t>Haga clic para modificar el estilo de texto del patrón</a:t>
             </a:r>
           </a:p>
@@ -8009,38 +7997,38 @@
           <a:p>
             <a:pPr lvl="0"/>
             <a:r>
-              <a:rPr lang="es-ES" smtClean="0"/>
+              <a:rPr lang="es-ES"/>
               <a:t>Haga clic para modificar el estilo de texto del patrón</a:t>
             </a:r>
           </a:p>
           <a:p>
             <a:pPr lvl="1"/>
             <a:r>
-              <a:rPr lang="es-ES" smtClean="0"/>
+              <a:rPr lang="es-ES"/>
               <a:t>Segundo nivel</a:t>
             </a:r>
           </a:p>
           <a:p>
             <a:pPr lvl="2"/>
             <a:r>
-              <a:rPr lang="es-ES" smtClean="0"/>
+              <a:rPr lang="es-ES"/>
               <a:t>Tercer nivel</a:t>
             </a:r>
           </a:p>
           <a:p>
             <a:pPr lvl="3"/>
             <a:r>
-              <a:rPr lang="es-ES" smtClean="0"/>
+              <a:rPr lang="es-ES"/>
               <a:t>Cuarto nivel</a:t>
             </a:r>
           </a:p>
           <a:p>
             <a:pPr lvl="4"/>
             <a:r>
-              <a:rPr lang="es-ES" smtClean="0"/>
+              <a:rPr lang="es-ES"/>
               <a:t>Quinto nivel</a:t>
             </a:r>
-            <a:endParaRPr lang="en-US" dirty="0"/>
+            <a:endParaRPr lang="en-US"/>
           </a:p>
         </p:txBody>
       </p:sp>
@@ -8106,7 +8094,7 @@
           <a:p>
             <a:pPr lvl="0"/>
             <a:r>
-              <a:rPr lang="es-ES" smtClean="0"/>
+              <a:rPr lang="es-ES"/>
               <a:t>Haga clic para modificar el estilo de texto del patrón</a:t>
             </a:r>
           </a:p>
@@ -8134,35 +8122,35 @@
           <a:p>
             <a:pPr lvl="0"/>
             <a:r>
-              <a:rPr lang="es-ES" smtClean="0"/>
+              <a:rPr lang="es-ES"/>
               <a:t>Haga clic para modificar el estilo de texto del patrón</a:t>
             </a:r>
           </a:p>
           <a:p>
             <a:pPr lvl="1"/>
             <a:r>
-              <a:rPr lang="es-ES" smtClean="0"/>
+              <a:rPr lang="es-ES"/>
               <a:t>Segundo nivel</a:t>
             </a:r>
           </a:p>
           <a:p>
             <a:pPr lvl="2"/>
             <a:r>
-              <a:rPr lang="es-ES" smtClean="0"/>
+              <a:rPr lang="es-ES"/>
               <a:t>Tercer nivel</a:t>
             </a:r>
           </a:p>
           <a:p>
             <a:pPr lvl="3"/>
             <a:r>
-              <a:rPr lang="es-ES" smtClean="0"/>
+              <a:rPr lang="es-ES"/>
               <a:t>Cuarto nivel</a:t>
             </a:r>
           </a:p>
           <a:p>
             <a:pPr lvl="4"/>
             <a:r>
-              <a:rPr lang="es-ES" smtClean="0"/>
+              <a:rPr lang="es-ES"/>
               <a:t>Quinto nivel</a:t>
             </a:r>
             <a:endParaRPr lang="en-US"/>
@@ -8186,7 +8174,7 @@
           <a:p>
             <a:fld id="{73CCA2E9-F8B7-4F9B-8722-72902CC82746}" type="datetimeFigureOut">
               <a:rPr lang="es-PA" smtClean="0"/>
-              <a:t>09/24/2018</a:t>
+              <a:t>11/24/2020</a:t>
             </a:fld>
             <a:endParaRPr lang="es-PA"/>
           </a:p>
@@ -8250,10 +8238,10 @@
           <a:lstStyle/>
           <a:p>
             <a:r>
-              <a:rPr lang="es-ES" smtClean="0"/>
+              <a:rPr lang="es-ES"/>
               <a:t>Haga clic para modificar el estilo de título del patrón</a:t>
             </a:r>
-            <a:endParaRPr lang="en-US" dirty="0"/>
+            <a:endParaRPr lang="en-US"/>
           </a:p>
         </p:txBody>
       </p:sp>
@@ -8279,13 +8267,6 @@
       </p:transition>
     </mc:Fallback>
   </mc:AlternateContent>
-  <p:timing>
-    <p:tnLst>
-      <p:par>
-        <p:cTn id="1" dur="indefinite" restart="never" nodeType="tmRoot"/>
-      </p:par>
-    </p:tnLst>
-  </p:timing>
 </p:sldLayout>
 </file>
 
@@ -8323,7 +8304,7 @@
           <a:p>
             <a:fld id="{73CCA2E9-F8B7-4F9B-8722-72902CC82746}" type="datetimeFigureOut">
               <a:rPr lang="es-PA" smtClean="0"/>
-              <a:t>09/24/2018</a:t>
+              <a:t>11/24/2020</a:t>
             </a:fld>
             <a:endParaRPr lang="es-PA"/>
           </a:p>
@@ -8387,7 +8368,7 @@
           <a:lstStyle/>
           <a:p>
             <a:r>
-              <a:rPr lang="es-ES" smtClean="0"/>
+              <a:rPr lang="es-ES"/>
               <a:t>Haga clic para modificar el estilo de título del patrón</a:t>
             </a:r>
             <a:endParaRPr lang="en-US"/>
@@ -8416,13 +8397,6 @@
       </p:transition>
     </mc:Fallback>
   </mc:AlternateContent>
-  <p:timing>
-    <p:tnLst>
-      <p:par>
-        <p:cTn id="1" dur="indefinite" restart="never" nodeType="tmRoot"/>
-      </p:par>
-    </p:tnLst>
-  </p:timing>
 </p:sldLayout>
 </file>
 
@@ -8460,7 +8434,7 @@
           <a:p>
             <a:fld id="{73CCA2E9-F8B7-4F9B-8722-72902CC82746}" type="datetimeFigureOut">
               <a:rPr lang="es-PA" smtClean="0"/>
-              <a:t>09/24/2018</a:t>
+              <a:t>11/24/2020</a:t>
             </a:fld>
             <a:endParaRPr lang="es-PA"/>
           </a:p>
@@ -10353,13 +10327,6 @@
       </p:transition>
     </mc:Fallback>
   </mc:AlternateContent>
-  <p:timing>
-    <p:tnLst>
-      <p:par>
-        <p:cTn id="1" dur="indefinite" restart="never" nodeType="tmRoot"/>
-      </p:par>
-    </p:tnLst>
-  </p:timing>
 </p:sldLayout>
 </file>
 
@@ -10407,10 +10374,10 @@
           </a:lstStyle>
           <a:p>
             <a:r>
-              <a:rPr lang="es-ES" smtClean="0"/>
+              <a:rPr lang="es-ES"/>
               <a:t>Haga clic para modificar el estilo de título del patrón</a:t>
             </a:r>
-            <a:endParaRPr lang="en-US" dirty="0"/>
+            <a:endParaRPr lang="en-US"/>
           </a:p>
         </p:txBody>
       </p:sp>
@@ -10464,38 +10431,38 @@
           <a:p>
             <a:pPr lvl="0"/>
             <a:r>
-              <a:rPr lang="es-ES" smtClean="0"/>
+              <a:rPr lang="es-ES"/>
               <a:t>Haga clic para modificar el estilo de texto del patrón</a:t>
             </a:r>
           </a:p>
           <a:p>
             <a:pPr lvl="1"/>
             <a:r>
-              <a:rPr lang="es-ES" smtClean="0"/>
+              <a:rPr lang="es-ES"/>
               <a:t>Segundo nivel</a:t>
             </a:r>
           </a:p>
           <a:p>
             <a:pPr lvl="2"/>
             <a:r>
-              <a:rPr lang="es-ES" smtClean="0"/>
+              <a:rPr lang="es-ES"/>
               <a:t>Tercer nivel</a:t>
             </a:r>
           </a:p>
           <a:p>
             <a:pPr lvl="3"/>
             <a:r>
-              <a:rPr lang="es-ES" smtClean="0"/>
+              <a:rPr lang="es-ES"/>
               <a:t>Cuarto nivel</a:t>
             </a:r>
           </a:p>
           <a:p>
             <a:pPr lvl="4"/>
             <a:r>
-              <a:rPr lang="es-ES" smtClean="0"/>
+              <a:rPr lang="es-ES"/>
               <a:t>Quinto nivel</a:t>
             </a:r>
-            <a:endParaRPr lang="en-US" dirty="0"/>
+            <a:endParaRPr lang="en-US"/>
           </a:p>
         </p:txBody>
       </p:sp>
@@ -10563,7 +10530,7 @@
           <a:p>
             <a:pPr lvl="0"/>
             <a:r>
-              <a:rPr lang="es-ES" smtClean="0"/>
+              <a:rPr lang="es-ES"/>
               <a:t>Haga clic para modificar el estilo de texto del patrón</a:t>
             </a:r>
           </a:p>
@@ -10587,9 +10554,9 @@
             <a:pPr rtl="0"/>
             <a:fld id="{53653A19-589A-4045-A0A7-A0896C41DFBA}" type="datetime1">
               <a:rPr lang="es-ES" noProof="0" smtClean="0"/>
-              <a:t>24/09/2018</a:t>
+              <a:t>24/11/2020</a:t>
             </a:fld>
-            <a:endParaRPr lang="es-ES" noProof="0" dirty="0"/>
+            <a:endParaRPr lang="es-ES" noProof="0"/>
           </a:p>
         </p:txBody>
       </p:sp>
@@ -10610,10 +10577,9 @@
           <a:p>
             <a:pPr rtl="0"/>
             <a:r>
-              <a:rPr lang="es-ES" noProof="0" smtClean="0"/>
+              <a:rPr lang="es-ES" noProof="0"/>
               <a:t>Agregar un pie de página</a:t>
             </a:r>
-            <a:endParaRPr lang="es-ES" noProof="0" dirty="0"/>
           </a:p>
         </p:txBody>
       </p:sp>
@@ -10638,7 +10604,7 @@
               <a:pPr rtl="0"/>
               <a:t>‹Nº›</a:t>
             </a:fld>
-            <a:endParaRPr lang="es-ES" noProof="0" dirty="0"/>
+            <a:endParaRPr lang="es-ES" noProof="0"/>
           </a:p>
         </p:txBody>
       </p:sp>
@@ -10652,13 +10618,6 @@
   <p:clrMapOvr>
     <a:masterClrMapping/>
   </p:clrMapOvr>
-  <p:timing>
-    <p:tnLst>
-      <p:par>
-        <p:cTn id="1" dur="indefinite" restart="never" nodeType="tmRoot"/>
-      </p:par>
-    </p:tnLst>
-  </p:timing>
   <p:hf sldNum="0" hdr="0" ftr="0" dt="0"/>
 </p:sldLayout>
 </file>
@@ -10696,10 +10655,10 @@
           <a:lstStyle/>
           <a:p>
             <a:r>
-              <a:rPr lang="es-ES" smtClean="0"/>
+              <a:rPr lang="es-ES"/>
               <a:t>Haga clic para modificar el estilo de título del patrón</a:t>
             </a:r>
-            <a:endParaRPr lang="en-US" dirty="0"/>
+            <a:endParaRPr lang="en-US"/>
           </a:p>
         </p:txBody>
       </p:sp>
@@ -10720,38 +10679,38 @@
           <a:p>
             <a:pPr lvl="0"/>
             <a:r>
-              <a:rPr lang="es-ES" smtClean="0"/>
+              <a:rPr lang="es-ES"/>
               <a:t>Haga clic para modificar el estilo de texto del patrón</a:t>
             </a:r>
           </a:p>
           <a:p>
             <a:pPr lvl="1"/>
             <a:r>
-              <a:rPr lang="es-ES" smtClean="0"/>
+              <a:rPr lang="es-ES"/>
               <a:t>Segundo nivel</a:t>
             </a:r>
           </a:p>
           <a:p>
             <a:pPr lvl="2"/>
             <a:r>
-              <a:rPr lang="es-ES" smtClean="0"/>
+              <a:rPr lang="es-ES"/>
               <a:t>Tercer nivel</a:t>
             </a:r>
           </a:p>
           <a:p>
             <a:pPr lvl="3"/>
             <a:r>
-              <a:rPr lang="es-ES" smtClean="0"/>
+              <a:rPr lang="es-ES"/>
               <a:t>Cuarto nivel</a:t>
             </a:r>
           </a:p>
           <a:p>
             <a:pPr lvl="4"/>
             <a:r>
-              <a:rPr lang="es-ES" smtClean="0"/>
+              <a:rPr lang="es-ES"/>
               <a:t>Quinto nivel</a:t>
             </a:r>
-            <a:endParaRPr lang="en-US" dirty="0"/>
+            <a:endParaRPr lang="en-US"/>
           </a:p>
         </p:txBody>
       </p:sp>
@@ -10773,9 +10732,9 @@
             <a:pPr rtl="0"/>
             <a:fld id="{53653A19-589A-4045-A0A7-A0896C41DFBA}" type="datetime1">
               <a:rPr lang="es-ES" noProof="0" smtClean="0"/>
-              <a:t>24/09/2018</a:t>
+              <a:t>24/11/2020</a:t>
             </a:fld>
-            <a:endParaRPr lang="es-ES" noProof="0" dirty="0"/>
+            <a:endParaRPr lang="es-ES" noProof="0"/>
           </a:p>
         </p:txBody>
       </p:sp>
@@ -10796,10 +10755,9 @@
           <a:p>
             <a:pPr rtl="0"/>
             <a:r>
-              <a:rPr lang="es-ES" noProof="0" smtClean="0"/>
+              <a:rPr lang="es-ES" noProof="0"/>
               <a:t>Agregar un pie de página</a:t>
             </a:r>
-            <a:endParaRPr lang="es-ES" noProof="0" dirty="0"/>
           </a:p>
         </p:txBody>
       </p:sp>
@@ -10824,7 +10782,7 @@
               <a:pPr rtl="0"/>
               <a:t>‹Nº›</a:t>
             </a:fld>
-            <a:endParaRPr lang="es-ES" noProof="0" dirty="0"/>
+            <a:endParaRPr lang="es-ES" noProof="0"/>
           </a:p>
         </p:txBody>
       </p:sp>
@@ -10838,13 +10796,6 @@
   <p:clrMapOvr>
     <a:masterClrMapping/>
   </p:clrMapOvr>
-  <p:timing>
-    <p:tnLst>
-      <p:par>
-        <p:cTn id="1" dur="indefinite" restart="never" nodeType="tmRoot"/>
-      </p:par>
-    </p:tnLst>
-  </p:timing>
   <p:hf sldNum="0" hdr="0" ftr="0" dt="0"/>
 </p:sldLayout>
 </file>
@@ -10893,10 +10844,10 @@
           </a:lstStyle>
           <a:p>
             <a:r>
-              <a:rPr lang="es-ES" smtClean="0"/>
+              <a:rPr lang="es-ES"/>
               <a:t>Haga clic para modificar el estilo de título del patrón</a:t>
             </a:r>
-            <a:endParaRPr lang="en-US" dirty="0"/>
+            <a:endParaRPr lang="en-US"/>
           </a:p>
         </p:txBody>
       </p:sp>
@@ -10958,10 +10909,10 @@
           </a:lstStyle>
           <a:p>
             <a:r>
-              <a:rPr lang="es-ES" smtClean="0"/>
+              <a:rPr lang="es-ES"/>
               <a:t>Haga clic en el icono para agregar una imagen</a:t>
             </a:r>
-            <a:endParaRPr lang="en-US" dirty="0"/>
+            <a:endParaRPr lang="en-US"/>
           </a:p>
         </p:txBody>
       </p:sp>
@@ -11029,7 +10980,7 @@
           <a:p>
             <a:pPr lvl="0"/>
             <a:r>
-              <a:rPr lang="es-ES" smtClean="0"/>
+              <a:rPr lang="es-ES"/>
               <a:t>Haga clic para modificar el estilo de texto del patrón</a:t>
             </a:r>
           </a:p>
@@ -11053,9 +11004,9 @@
             <a:pPr rtl="0"/>
             <a:fld id="{53653A19-589A-4045-A0A7-A0896C41DFBA}" type="datetime1">
               <a:rPr lang="es-ES" noProof="0" smtClean="0"/>
-              <a:t>24/09/2018</a:t>
+              <a:t>24/11/2020</a:t>
             </a:fld>
-            <a:endParaRPr lang="es-ES" noProof="0" dirty="0"/>
+            <a:endParaRPr lang="es-ES" noProof="0"/>
           </a:p>
         </p:txBody>
       </p:sp>
@@ -11076,10 +11027,9 @@
           <a:p>
             <a:pPr rtl="0"/>
             <a:r>
-              <a:rPr lang="es-ES" noProof="0" smtClean="0"/>
+              <a:rPr lang="es-ES" noProof="0"/>
               <a:t>Agregar un pie de página</a:t>
             </a:r>
-            <a:endParaRPr lang="es-ES" noProof="0" dirty="0"/>
           </a:p>
         </p:txBody>
       </p:sp>
@@ -11104,7 +11054,7 @@
               <a:pPr rtl="0"/>
               <a:t>‹Nº›</a:t>
             </a:fld>
-            <a:endParaRPr lang="es-ES" noProof="0" dirty="0"/>
+            <a:endParaRPr lang="es-ES" noProof="0"/>
           </a:p>
         </p:txBody>
       </p:sp>
@@ -11118,13 +11068,6 @@
   <p:clrMapOvr>
     <a:masterClrMapping/>
   </p:clrMapOvr>
-  <p:timing>
-    <p:tnLst>
-      <p:par>
-        <p:cTn id="1" dur="indefinite" restart="never" nodeType="tmRoot"/>
-      </p:par>
-    </p:tnLst>
-  </p:timing>
   <p:hf sldNum="0" hdr="0" ftr="0" dt="0"/>
 </p:sldLayout>
 </file>
@@ -11162,7 +11105,7 @@
           <a:lstStyle/>
           <a:p>
             <a:r>
-              <a:rPr lang="es-ES" smtClean="0"/>
+              <a:rPr lang="es-ES"/>
               <a:t>Haga clic para modificar el estilo de título del patrón</a:t>
             </a:r>
             <a:endParaRPr lang="en-US"/>
@@ -11186,38 +11129,38 @@
           <a:p>
             <a:pPr lvl="0"/>
             <a:r>
-              <a:rPr lang="es-ES" smtClean="0"/>
+              <a:rPr lang="es-ES"/>
               <a:t>Haga clic para modificar el estilo de texto del patrón</a:t>
             </a:r>
           </a:p>
           <a:p>
             <a:pPr lvl="1"/>
             <a:r>
-              <a:rPr lang="es-ES" smtClean="0"/>
+              <a:rPr lang="es-ES"/>
               <a:t>Segundo nivel</a:t>
             </a:r>
           </a:p>
           <a:p>
             <a:pPr lvl="2"/>
             <a:r>
-              <a:rPr lang="es-ES" smtClean="0"/>
+              <a:rPr lang="es-ES"/>
               <a:t>Tercer nivel</a:t>
             </a:r>
           </a:p>
           <a:p>
             <a:pPr lvl="3"/>
             <a:r>
-              <a:rPr lang="es-ES" smtClean="0"/>
+              <a:rPr lang="es-ES"/>
               <a:t>Cuarto nivel</a:t>
             </a:r>
           </a:p>
           <a:p>
             <a:pPr lvl="4"/>
             <a:r>
-              <a:rPr lang="es-ES" smtClean="0"/>
+              <a:rPr lang="es-ES"/>
               <a:t>Quinto nivel</a:t>
             </a:r>
-            <a:endParaRPr lang="en-US" dirty="0"/>
+            <a:endParaRPr lang="en-US"/>
           </a:p>
         </p:txBody>
       </p:sp>
@@ -11238,7 +11181,7 @@
           <a:p>
             <a:fld id="{73CCA2E9-F8B7-4F9B-8722-72902CC82746}" type="datetimeFigureOut">
               <a:rPr lang="es-PA" smtClean="0"/>
-              <a:t>09/24/2018</a:t>
+              <a:t>11/24/2020</a:t>
             </a:fld>
             <a:endParaRPr lang="es-PA"/>
           </a:p>
@@ -11308,13 +11251,6 @@
       </p:transition>
     </mc:Fallback>
   </mc:AlternateContent>
-  <p:timing>
-    <p:tnLst>
-      <p:par>
-        <p:cTn id="1" dur="indefinite" restart="never" nodeType="tmRoot"/>
-      </p:par>
-    </p:tnLst>
-  </p:timing>
 </p:sldLayout>
 </file>
 
@@ -11356,7 +11292,7 @@
           <a:lstStyle/>
           <a:p>
             <a:r>
-              <a:rPr lang="es-ES" smtClean="0"/>
+              <a:rPr lang="es-ES"/>
               <a:t>Haga clic para modificar el estilo de título del patrón</a:t>
             </a:r>
             <a:endParaRPr lang="en-US"/>
@@ -11385,35 +11321,35 @@
           <a:p>
             <a:pPr lvl="0"/>
             <a:r>
-              <a:rPr lang="es-ES" smtClean="0"/>
+              <a:rPr lang="es-ES"/>
               <a:t>Haga clic para modificar el estilo de texto del patrón</a:t>
             </a:r>
           </a:p>
           <a:p>
             <a:pPr lvl="1"/>
             <a:r>
-              <a:rPr lang="es-ES" smtClean="0"/>
+              <a:rPr lang="es-ES"/>
               <a:t>Segundo nivel</a:t>
             </a:r>
           </a:p>
           <a:p>
             <a:pPr lvl="2"/>
             <a:r>
-              <a:rPr lang="es-ES" smtClean="0"/>
+              <a:rPr lang="es-ES"/>
               <a:t>Tercer nivel</a:t>
             </a:r>
           </a:p>
           <a:p>
             <a:pPr lvl="3"/>
             <a:r>
-              <a:rPr lang="es-ES" smtClean="0"/>
+              <a:rPr lang="es-ES"/>
               <a:t>Cuarto nivel</a:t>
             </a:r>
           </a:p>
           <a:p>
             <a:pPr lvl="4"/>
             <a:r>
-              <a:rPr lang="es-ES" smtClean="0"/>
+              <a:rPr lang="es-ES"/>
               <a:t>Quinto nivel</a:t>
             </a:r>
             <a:endParaRPr lang="en-US"/>
@@ -11437,7 +11373,7 @@
           <a:p>
             <a:fld id="{73CCA2E9-F8B7-4F9B-8722-72902CC82746}" type="datetimeFigureOut">
               <a:rPr lang="es-PA" smtClean="0"/>
-              <a:t>09/24/2018</a:t>
+              <a:t>11/24/2020</a:t>
             </a:fld>
             <a:endParaRPr lang="es-PA"/>
           </a:p>
@@ -11507,13 +11443,6 @@
       </p:transition>
     </mc:Fallback>
   </mc:AlternateContent>
-  <p:timing>
-    <p:tnLst>
-      <p:par>
-        <p:cTn id="1" dur="indefinite" restart="never" nodeType="tmRoot"/>
-      </p:par>
-    </p:tnLst>
-  </p:timing>
 </p:sldLayout>
 </file>
 
@@ -11561,10 +11490,10 @@
           </a:lstStyle>
           <a:p>
             <a:r>
-              <a:rPr lang="es-ES" smtClean="0"/>
+              <a:rPr lang="es-ES"/>
               <a:t>Haga clic para modificar el estilo de título del patrón</a:t>
             </a:r>
-            <a:endParaRPr lang="en-US" dirty="0"/>
+            <a:endParaRPr lang="en-US"/>
           </a:p>
         </p:txBody>
       </p:sp>
@@ -11684,7 +11613,7 @@
           <a:p>
             <a:pPr lvl="0"/>
             <a:r>
-              <a:rPr lang="es-ES" smtClean="0"/>
+              <a:rPr lang="es-ES"/>
               <a:t>Haga clic para modificar el estilo de texto del patrón</a:t>
             </a:r>
           </a:p>
@@ -11707,7 +11636,7 @@
           <a:p>
             <a:fld id="{73CCA2E9-F8B7-4F9B-8722-72902CC82746}" type="datetimeFigureOut">
               <a:rPr lang="es-PA" smtClean="0"/>
-              <a:t>09/24/2018</a:t>
+              <a:t>11/24/2020</a:t>
             </a:fld>
             <a:endParaRPr lang="es-PA"/>
           </a:p>
@@ -13635,13 +13564,6 @@
       </p:transition>
     </mc:Fallback>
   </mc:AlternateContent>
-  <p:timing>
-    <p:tnLst>
-      <p:par>
-        <p:cTn id="1" dur="indefinite" restart="never" nodeType="tmRoot"/>
-      </p:par>
-    </p:tnLst>
-  </p:timing>
 </p:sldLayout>
 </file>
 
@@ -13678,10 +13600,10 @@
           <a:lstStyle/>
           <a:p>
             <a:r>
-              <a:rPr lang="es-ES" smtClean="0"/>
+              <a:rPr lang="es-ES"/>
               <a:t>Haga clic para modificar el estilo de título del patrón</a:t>
             </a:r>
-            <a:endParaRPr lang="en-US" dirty="0"/>
+            <a:endParaRPr lang="en-US"/>
           </a:p>
         </p:txBody>
       </p:sp>
@@ -13707,38 +13629,38 @@
           <a:p>
             <a:pPr lvl="0"/>
             <a:r>
-              <a:rPr lang="es-ES" smtClean="0"/>
+              <a:rPr lang="es-ES"/>
               <a:t>Haga clic para modificar el estilo de texto del patrón</a:t>
             </a:r>
           </a:p>
           <a:p>
             <a:pPr lvl="1"/>
             <a:r>
-              <a:rPr lang="es-ES" smtClean="0"/>
+              <a:rPr lang="es-ES"/>
               <a:t>Segundo nivel</a:t>
             </a:r>
           </a:p>
           <a:p>
             <a:pPr lvl="2"/>
             <a:r>
-              <a:rPr lang="es-ES" smtClean="0"/>
+              <a:rPr lang="es-ES"/>
               <a:t>Tercer nivel</a:t>
             </a:r>
           </a:p>
           <a:p>
             <a:pPr lvl="3"/>
             <a:r>
-              <a:rPr lang="es-ES" smtClean="0"/>
+              <a:rPr lang="es-ES"/>
               <a:t>Cuarto nivel</a:t>
             </a:r>
           </a:p>
           <a:p>
             <a:pPr lvl="4"/>
             <a:r>
-              <a:rPr lang="es-ES" smtClean="0"/>
+              <a:rPr lang="es-ES"/>
               <a:t>Quinto nivel</a:t>
             </a:r>
-            <a:endParaRPr lang="en-US" dirty="0"/>
+            <a:endParaRPr lang="en-US"/>
           </a:p>
         </p:txBody>
       </p:sp>
@@ -13764,38 +13686,38 @@
           <a:p>
             <a:pPr lvl="0"/>
             <a:r>
-              <a:rPr lang="es-ES" smtClean="0"/>
+              <a:rPr lang="es-ES"/>
               <a:t>Haga clic para modificar el estilo de texto del patrón</a:t>
             </a:r>
           </a:p>
           <a:p>
             <a:pPr lvl="1"/>
             <a:r>
-              <a:rPr lang="es-ES" smtClean="0"/>
+              <a:rPr lang="es-ES"/>
               <a:t>Segundo nivel</a:t>
             </a:r>
           </a:p>
           <a:p>
             <a:pPr lvl="2"/>
             <a:r>
-              <a:rPr lang="es-ES" smtClean="0"/>
+              <a:rPr lang="es-ES"/>
               <a:t>Tercer nivel</a:t>
             </a:r>
           </a:p>
           <a:p>
             <a:pPr lvl="3"/>
             <a:r>
-              <a:rPr lang="es-ES" smtClean="0"/>
+              <a:rPr lang="es-ES"/>
               <a:t>Cuarto nivel</a:t>
             </a:r>
           </a:p>
           <a:p>
             <a:pPr lvl="4"/>
             <a:r>
-              <a:rPr lang="es-ES" smtClean="0"/>
+              <a:rPr lang="es-ES"/>
               <a:t>Quinto nivel</a:t>
             </a:r>
-            <a:endParaRPr lang="en-US" dirty="0"/>
+            <a:endParaRPr lang="en-US"/>
           </a:p>
         </p:txBody>
       </p:sp>
@@ -13816,7 +13738,7 @@
           <a:p>
             <a:fld id="{73CCA2E9-F8B7-4F9B-8722-72902CC82746}" type="datetimeFigureOut">
               <a:rPr lang="es-PA" smtClean="0"/>
-              <a:t>09/24/2018</a:t>
+              <a:t>11/24/2020</a:t>
             </a:fld>
             <a:endParaRPr lang="es-PA"/>
           </a:p>
@@ -13886,13 +13808,6 @@
       </p:transition>
     </mc:Fallback>
   </mc:AlternateContent>
-  <p:timing>
-    <p:tnLst>
-      <p:par>
-        <p:cTn id="1" dur="indefinite" restart="never" nodeType="tmRoot"/>
-      </p:par>
-    </p:tnLst>
-  </p:timing>
 </p:sldLayout>
 </file>
 
@@ -13977,7 +13892,7 @@
           <a:p>
             <a:pPr lvl="0"/>
             <a:r>
-              <a:rPr lang="es-ES" smtClean="0"/>
+              <a:rPr lang="es-ES"/>
               <a:t>Haga clic para modificar el estilo de texto del patrón</a:t>
             </a:r>
           </a:p>
@@ -14005,38 +13920,38 @@
           <a:p>
             <a:pPr lvl="0"/>
             <a:r>
-              <a:rPr lang="es-ES" smtClean="0"/>
+              <a:rPr lang="es-ES"/>
               <a:t>Haga clic para modificar el estilo de texto del patrón</a:t>
             </a:r>
           </a:p>
           <a:p>
             <a:pPr lvl="1"/>
             <a:r>
-              <a:rPr lang="es-ES" smtClean="0"/>
+              <a:rPr lang="es-ES"/>
               <a:t>Segundo nivel</a:t>
             </a:r>
           </a:p>
           <a:p>
             <a:pPr lvl="2"/>
             <a:r>
-              <a:rPr lang="es-ES" smtClean="0"/>
+              <a:rPr lang="es-ES"/>
               <a:t>Tercer nivel</a:t>
             </a:r>
           </a:p>
           <a:p>
             <a:pPr lvl="3"/>
             <a:r>
-              <a:rPr lang="es-ES" smtClean="0"/>
+              <a:rPr lang="es-ES"/>
               <a:t>Cuarto nivel</a:t>
             </a:r>
           </a:p>
           <a:p>
             <a:pPr lvl="4"/>
             <a:r>
-              <a:rPr lang="es-ES" smtClean="0"/>
+              <a:rPr lang="es-ES"/>
               <a:t>Quinto nivel</a:t>
             </a:r>
-            <a:endParaRPr lang="en-US" dirty="0"/>
+            <a:endParaRPr lang="en-US"/>
           </a:p>
         </p:txBody>
       </p:sp>
@@ -14102,7 +14017,7 @@
           <a:p>
             <a:pPr lvl="0"/>
             <a:r>
-              <a:rPr lang="es-ES" smtClean="0"/>
+              <a:rPr lang="es-ES"/>
               <a:t>Haga clic para modificar el estilo de texto del patrón</a:t>
             </a:r>
           </a:p>
@@ -14130,35 +14045,35 @@
           <a:p>
             <a:pPr lvl="0"/>
             <a:r>
-              <a:rPr lang="es-ES" smtClean="0"/>
+              <a:rPr lang="es-ES"/>
               <a:t>Haga clic para modificar el estilo de texto del patrón</a:t>
             </a:r>
           </a:p>
           <a:p>
             <a:pPr lvl="1"/>
             <a:r>
-              <a:rPr lang="es-ES" smtClean="0"/>
+              <a:rPr lang="es-ES"/>
               <a:t>Segundo nivel</a:t>
             </a:r>
           </a:p>
           <a:p>
             <a:pPr lvl="2"/>
             <a:r>
-              <a:rPr lang="es-ES" smtClean="0"/>
+              <a:rPr lang="es-ES"/>
               <a:t>Tercer nivel</a:t>
             </a:r>
           </a:p>
           <a:p>
             <a:pPr lvl="3"/>
             <a:r>
-              <a:rPr lang="es-ES" smtClean="0"/>
+              <a:rPr lang="es-ES"/>
               <a:t>Cuarto nivel</a:t>
             </a:r>
           </a:p>
           <a:p>
             <a:pPr lvl="4"/>
             <a:r>
-              <a:rPr lang="es-ES" smtClean="0"/>
+              <a:rPr lang="es-ES"/>
               <a:t>Quinto nivel</a:t>
             </a:r>
             <a:endParaRPr lang="en-US"/>
@@ -14182,7 +14097,7 @@
           <a:p>
             <a:fld id="{73CCA2E9-F8B7-4F9B-8722-72902CC82746}" type="datetimeFigureOut">
               <a:rPr lang="es-PA" smtClean="0"/>
-              <a:t>09/24/2018</a:t>
+              <a:t>11/24/2020</a:t>
             </a:fld>
             <a:endParaRPr lang="es-PA"/>
           </a:p>
@@ -14246,10 +14161,10 @@
           <a:lstStyle/>
           <a:p>
             <a:r>
-              <a:rPr lang="es-ES" smtClean="0"/>
+              <a:rPr lang="es-ES"/>
               <a:t>Haga clic para modificar el estilo de título del patrón</a:t>
             </a:r>
-            <a:endParaRPr lang="en-US" dirty="0"/>
+            <a:endParaRPr lang="en-US"/>
           </a:p>
         </p:txBody>
       </p:sp>
@@ -14275,13 +14190,6 @@
       </p:transition>
     </mc:Fallback>
   </mc:AlternateContent>
-  <p:timing>
-    <p:tnLst>
-      <p:par>
-        <p:cTn id="1" dur="indefinite" restart="never" nodeType="tmRoot"/>
-      </p:par>
-    </p:tnLst>
-  </p:timing>
 </p:sldLayout>
 </file>
 
@@ -14319,7 +14227,7 @@
           <a:p>
             <a:fld id="{73CCA2E9-F8B7-4F9B-8722-72902CC82746}" type="datetimeFigureOut">
               <a:rPr lang="es-PA" smtClean="0"/>
-              <a:t>09/24/2018</a:t>
+              <a:t>11/24/2020</a:t>
             </a:fld>
             <a:endParaRPr lang="es-PA"/>
           </a:p>
@@ -14383,7 +14291,7 @@
           <a:lstStyle/>
           <a:p>
             <a:r>
-              <a:rPr lang="es-ES" smtClean="0"/>
+              <a:rPr lang="es-ES"/>
               <a:t>Haga clic para modificar el estilo de título del patrón</a:t>
             </a:r>
             <a:endParaRPr lang="en-US"/>
@@ -14412,13 +14320,6 @@
       </p:transition>
     </mc:Fallback>
   </mc:AlternateContent>
-  <p:timing>
-    <p:tnLst>
-      <p:par>
-        <p:cTn id="1" dur="indefinite" restart="never" nodeType="tmRoot"/>
-      </p:par>
-    </p:tnLst>
-  </p:timing>
 </p:sldLayout>
 </file>
 
@@ -14456,7 +14357,7 @@
           <a:p>
             <a:fld id="{73CCA2E9-F8B7-4F9B-8722-72902CC82746}" type="datetimeFigureOut">
               <a:rPr lang="es-PA" smtClean="0"/>
-              <a:t>09/24/2018</a:t>
+              <a:t>11/24/2020</a:t>
             </a:fld>
             <a:endParaRPr lang="es-PA"/>
           </a:p>
@@ -16349,13 +16250,6 @@
       </p:transition>
     </mc:Fallback>
   </mc:AlternateContent>
-  <p:timing>
-    <p:tnLst>
-      <p:par>
-        <p:cTn id="1" dur="indefinite" restart="never" nodeType="tmRoot"/>
-      </p:par>
-    </p:tnLst>
-  </p:timing>
 </p:sldLayout>
 </file>
 
@@ -16403,10 +16297,10 @@
           </a:lstStyle>
           <a:p>
             <a:r>
-              <a:rPr lang="es-ES" smtClean="0"/>
+              <a:rPr lang="es-ES"/>
               <a:t>Haga clic para modificar el estilo de título del patrón</a:t>
             </a:r>
-            <a:endParaRPr lang="en-US" dirty="0"/>
+            <a:endParaRPr lang="en-US"/>
           </a:p>
         </p:txBody>
       </p:sp>
@@ -16460,38 +16354,38 @@
           <a:p>
             <a:pPr lvl="0"/>
             <a:r>
-              <a:rPr lang="es-ES" smtClean="0"/>
+              <a:rPr lang="es-ES"/>
               <a:t>Haga clic para modificar el estilo de texto del patrón</a:t>
             </a:r>
           </a:p>
           <a:p>
             <a:pPr lvl="1"/>
             <a:r>
-              <a:rPr lang="es-ES" smtClean="0"/>
+              <a:rPr lang="es-ES"/>
               <a:t>Segundo nivel</a:t>
             </a:r>
           </a:p>
           <a:p>
             <a:pPr lvl="2"/>
             <a:r>
-              <a:rPr lang="es-ES" smtClean="0"/>
+              <a:rPr lang="es-ES"/>
               <a:t>Tercer nivel</a:t>
             </a:r>
           </a:p>
           <a:p>
             <a:pPr lvl="3"/>
             <a:r>
-              <a:rPr lang="es-ES" smtClean="0"/>
+              <a:rPr lang="es-ES"/>
               <a:t>Cuarto nivel</a:t>
             </a:r>
           </a:p>
           <a:p>
             <a:pPr lvl="4"/>
             <a:r>
-              <a:rPr lang="es-ES" smtClean="0"/>
+              <a:rPr lang="es-ES"/>
               <a:t>Quinto nivel</a:t>
             </a:r>
-            <a:endParaRPr lang="en-US" dirty="0"/>
+            <a:endParaRPr lang="en-US"/>
           </a:p>
         </p:txBody>
       </p:sp>
@@ -16559,7 +16453,7 @@
           <a:p>
             <a:pPr lvl="0"/>
             <a:r>
-              <a:rPr lang="es-ES" smtClean="0"/>
+              <a:rPr lang="es-ES"/>
               <a:t>Haga clic para modificar el estilo de texto del patrón</a:t>
             </a:r>
           </a:p>
@@ -16583,9 +16477,9 @@
             <a:pPr rtl="0"/>
             <a:fld id="{53653A19-589A-4045-A0A7-A0896C41DFBA}" type="datetime1">
               <a:rPr lang="es-ES" noProof="0" smtClean="0"/>
-              <a:t>24/09/2018</a:t>
+              <a:t>24/11/2020</a:t>
             </a:fld>
-            <a:endParaRPr lang="es-ES" noProof="0" dirty="0"/>
+            <a:endParaRPr lang="es-ES" noProof="0"/>
           </a:p>
         </p:txBody>
       </p:sp>
@@ -16606,10 +16500,9 @@
           <a:p>
             <a:pPr rtl="0"/>
             <a:r>
-              <a:rPr lang="es-ES" noProof="0" smtClean="0"/>
+              <a:rPr lang="es-ES" noProof="0"/>
               <a:t>Agregar un pie de página</a:t>
             </a:r>
-            <a:endParaRPr lang="es-ES" noProof="0" dirty="0"/>
           </a:p>
         </p:txBody>
       </p:sp>
@@ -16634,7 +16527,7 @@
               <a:pPr rtl="0"/>
               <a:t>‹Nº›</a:t>
             </a:fld>
-            <a:endParaRPr lang="es-ES" noProof="0" dirty="0"/>
+            <a:endParaRPr lang="es-ES" noProof="0"/>
           </a:p>
         </p:txBody>
       </p:sp>
@@ -16648,13 +16541,6 @@
   <p:clrMapOvr>
     <a:masterClrMapping/>
   </p:clrMapOvr>
-  <p:timing>
-    <p:tnLst>
-      <p:par>
-        <p:cTn id="1" dur="indefinite" restart="never" nodeType="tmRoot"/>
-      </p:par>
-    </p:tnLst>
-  </p:timing>
   <p:hf sldNum="0" hdr="0" ftr="0" dt="0"/>
 </p:sldLayout>
 </file>
@@ -16703,10 +16589,10 @@
           </a:lstStyle>
           <a:p>
             <a:r>
-              <a:rPr lang="es-ES" smtClean="0"/>
+              <a:rPr lang="es-ES"/>
               <a:t>Haga clic para modificar el estilo de título del patrón</a:t>
             </a:r>
-            <a:endParaRPr lang="en-US" dirty="0"/>
+            <a:endParaRPr lang="en-US"/>
           </a:p>
         </p:txBody>
       </p:sp>
@@ -16768,10 +16654,10 @@
           </a:lstStyle>
           <a:p>
             <a:r>
-              <a:rPr lang="es-ES" smtClean="0"/>
+              <a:rPr lang="es-ES"/>
               <a:t>Haga clic en el icono para agregar una imagen</a:t>
             </a:r>
-            <a:endParaRPr lang="en-US" dirty="0"/>
+            <a:endParaRPr lang="en-US"/>
           </a:p>
         </p:txBody>
       </p:sp>
@@ -16839,7 +16725,7 @@
           <a:p>
             <a:pPr lvl="0"/>
             <a:r>
-              <a:rPr lang="es-ES" smtClean="0"/>
+              <a:rPr lang="es-ES"/>
               <a:t>Haga clic para modificar el estilo de texto del patrón</a:t>
             </a:r>
           </a:p>
@@ -16863,9 +16749,9 @@
             <a:pPr rtl="0"/>
             <a:fld id="{53653A19-589A-4045-A0A7-A0896C41DFBA}" type="datetime1">
               <a:rPr lang="es-ES" noProof="0" smtClean="0"/>
-              <a:t>24/09/2018</a:t>
+              <a:t>24/11/2020</a:t>
             </a:fld>
-            <a:endParaRPr lang="es-ES" noProof="0" dirty="0"/>
+            <a:endParaRPr lang="es-ES" noProof="0"/>
           </a:p>
         </p:txBody>
       </p:sp>
@@ -16886,10 +16772,9 @@
           <a:p>
             <a:pPr rtl="0"/>
             <a:r>
-              <a:rPr lang="es-ES" noProof="0" smtClean="0"/>
+              <a:rPr lang="es-ES" noProof="0"/>
               <a:t>Agregar un pie de página</a:t>
             </a:r>
-            <a:endParaRPr lang="es-ES" noProof="0" dirty="0"/>
           </a:p>
         </p:txBody>
       </p:sp>
@@ -16914,7 +16799,7 @@
               <a:pPr rtl="0"/>
               <a:t>‹Nº›</a:t>
             </a:fld>
-            <a:endParaRPr lang="es-ES" noProof="0" dirty="0"/>
+            <a:endParaRPr lang="es-ES" noProof="0"/>
           </a:p>
         </p:txBody>
       </p:sp>
@@ -16928,13 +16813,6 @@
   <p:clrMapOvr>
     <a:masterClrMapping/>
   </p:clrMapOvr>
-  <p:timing>
-    <p:tnLst>
-      <p:par>
-        <p:cTn id="1" dur="indefinite" restart="never" nodeType="tmRoot"/>
-      </p:par>
-    </p:tnLst>
-  </p:timing>
   <p:hf sldNum="0" hdr="0" ftr="0" dt="0"/>
 </p:sldLayout>
 </file>
@@ -16987,10 +16865,10 @@
           <a:lstStyle/>
           <a:p>
             <a:r>
-              <a:rPr lang="es-ES" smtClean="0"/>
+              <a:rPr lang="es-ES"/>
               <a:t>Haga clic para modificar el estilo de título del patrón</a:t>
             </a:r>
-            <a:endParaRPr lang="en-US" dirty="0"/>
+            <a:endParaRPr lang="en-US"/>
           </a:p>
         </p:txBody>
       </p:sp>
@@ -17021,38 +16899,38 @@
           <a:p>
             <a:pPr lvl="0"/>
             <a:r>
-              <a:rPr lang="es-ES" smtClean="0"/>
+              <a:rPr lang="es-ES"/>
               <a:t>Haga clic para modificar el estilo de texto del patrón</a:t>
             </a:r>
           </a:p>
           <a:p>
             <a:pPr lvl="1"/>
             <a:r>
-              <a:rPr lang="es-ES" smtClean="0"/>
+              <a:rPr lang="es-ES"/>
               <a:t>Segundo nivel</a:t>
             </a:r>
           </a:p>
           <a:p>
             <a:pPr lvl="2"/>
             <a:r>
-              <a:rPr lang="es-ES" smtClean="0"/>
+              <a:rPr lang="es-ES"/>
               <a:t>Tercer nivel</a:t>
             </a:r>
           </a:p>
           <a:p>
             <a:pPr lvl="3"/>
             <a:r>
-              <a:rPr lang="es-ES" smtClean="0"/>
+              <a:rPr lang="es-ES"/>
               <a:t>Cuarto nivel</a:t>
             </a:r>
           </a:p>
           <a:p>
             <a:pPr lvl="4"/>
             <a:r>
-              <a:rPr lang="es-ES" smtClean="0"/>
+              <a:rPr lang="es-ES"/>
               <a:t>Quinto nivel</a:t>
             </a:r>
-            <a:endParaRPr lang="en-US" dirty="0"/>
+            <a:endParaRPr lang="en-US"/>
           </a:p>
         </p:txBody>
       </p:sp>
@@ -17093,9 +16971,9 @@
             <a:pPr rtl="0"/>
             <a:fld id="{53653A19-589A-4045-A0A7-A0896C41DFBA}" type="datetime1">
               <a:rPr lang="es-ES" noProof="0" smtClean="0"/>
-              <a:t>24/09/2018</a:t>
+              <a:t>24/11/2020</a:t>
             </a:fld>
-            <a:endParaRPr lang="es-ES" noProof="0" dirty="0"/>
+            <a:endParaRPr lang="es-ES" noProof="0"/>
           </a:p>
         </p:txBody>
       </p:sp>
@@ -17135,10 +17013,9 @@
           <a:p>
             <a:pPr rtl="0"/>
             <a:r>
-              <a:rPr lang="es-ES" noProof="0" smtClean="0"/>
+              <a:rPr lang="es-ES" noProof="0"/>
               <a:t>Agregar un pie de página</a:t>
             </a:r>
-            <a:endParaRPr lang="es-ES" noProof="0" dirty="0"/>
           </a:p>
         </p:txBody>
       </p:sp>
@@ -17181,7 +17058,7 @@
               <a:pPr rtl="0"/>
               <a:t>‹Nº›</a:t>
             </a:fld>
-            <a:endParaRPr lang="es-ES" noProof="0" dirty="0"/>
+            <a:endParaRPr lang="es-ES" noProof="0"/>
           </a:p>
         </p:txBody>
       </p:sp>
@@ -19078,13 +18955,6 @@
       </p:transition>
     </mc:Fallback>
   </mc:AlternateContent>
-  <p:timing>
-    <p:tnLst>
-      <p:par>
-        <p:cTn id="1" dur="indefinite" restart="never" nodeType="tmRoot"/>
-      </p:par>
-    </p:tnLst>
-  </p:timing>
   <p:hf sldNum="0" hdr="0" ftr="0" dt="0"/>
   <p:txStyles>
     <p:titleStyle>
@@ -19421,10 +19291,10 @@
           <a:lstStyle/>
           <a:p>
             <a:r>
-              <a:rPr lang="es-ES" smtClean="0"/>
+              <a:rPr lang="es-ES"/>
               <a:t>Haga clic para modificar el estilo de título del patrón</a:t>
             </a:r>
-            <a:endParaRPr lang="en-US" dirty="0"/>
+            <a:endParaRPr lang="en-US"/>
           </a:p>
         </p:txBody>
       </p:sp>
@@ -19455,38 +19325,38 @@
           <a:p>
             <a:pPr lvl="0"/>
             <a:r>
-              <a:rPr lang="es-ES" smtClean="0"/>
+              <a:rPr lang="es-ES"/>
               <a:t>Haga clic para modificar el estilo de texto del patrón</a:t>
             </a:r>
           </a:p>
           <a:p>
             <a:pPr lvl="1"/>
             <a:r>
-              <a:rPr lang="es-ES" smtClean="0"/>
+              <a:rPr lang="es-ES"/>
               <a:t>Segundo nivel</a:t>
             </a:r>
           </a:p>
           <a:p>
             <a:pPr lvl="2"/>
             <a:r>
-              <a:rPr lang="es-ES" smtClean="0"/>
+              <a:rPr lang="es-ES"/>
               <a:t>Tercer nivel</a:t>
             </a:r>
           </a:p>
           <a:p>
             <a:pPr lvl="3"/>
             <a:r>
-              <a:rPr lang="es-ES" smtClean="0"/>
+              <a:rPr lang="es-ES"/>
               <a:t>Cuarto nivel</a:t>
             </a:r>
           </a:p>
           <a:p>
             <a:pPr lvl="4"/>
             <a:r>
-              <a:rPr lang="es-ES" smtClean="0"/>
+              <a:rPr lang="es-ES"/>
               <a:t>Quinto nivel</a:t>
             </a:r>
-            <a:endParaRPr lang="en-US" dirty="0"/>
+            <a:endParaRPr lang="en-US"/>
           </a:p>
         </p:txBody>
       </p:sp>
@@ -19527,9 +19397,9 @@
             <a:pPr rtl="0"/>
             <a:fld id="{53653A19-589A-4045-A0A7-A0896C41DFBA}" type="datetime1">
               <a:rPr lang="es-ES" noProof="0" smtClean="0"/>
-              <a:t>24/09/2018</a:t>
+              <a:t>24/11/2020</a:t>
             </a:fld>
-            <a:endParaRPr lang="es-ES" noProof="0" dirty="0"/>
+            <a:endParaRPr lang="es-ES" noProof="0"/>
           </a:p>
         </p:txBody>
       </p:sp>
@@ -19569,10 +19439,9 @@
           <a:p>
             <a:pPr rtl="0"/>
             <a:r>
-              <a:rPr lang="es-ES" noProof="0" smtClean="0"/>
+              <a:rPr lang="es-ES" noProof="0"/>
               <a:t>Agregar un pie de página</a:t>
             </a:r>
-            <a:endParaRPr lang="es-ES" noProof="0" dirty="0"/>
           </a:p>
         </p:txBody>
       </p:sp>
@@ -19615,7 +19484,7 @@
               <a:pPr rtl="0"/>
               <a:t>‹Nº›</a:t>
             </a:fld>
-            <a:endParaRPr lang="es-ES" noProof="0" dirty="0"/>
+            <a:endParaRPr lang="es-ES" noProof="0"/>
           </a:p>
         </p:txBody>
       </p:sp>
@@ -21512,13 +21381,6 @@
       </p:transition>
     </mc:Fallback>
   </mc:AlternateContent>
-  <p:timing>
-    <p:tnLst>
-      <p:par>
-        <p:cTn id="1" dur="indefinite" restart="never" nodeType="tmRoot"/>
-      </p:par>
-    </p:tnLst>
-  </p:timing>
   <p:hf sldNum="0" hdr="0" ftr="0" dt="0"/>
   <p:txStyles>
     <p:titleStyle>
@@ -21826,8 +21688,10 @@
       </p:grpSpPr>
       <p:cxnSp>
         <p:nvCxnSpPr>
-          <p:cNvPr id="421" name="OTLSHAPE_T_5fb83712d998486794713810c5f37960_HorizontalConnector1"/>
-          <p:cNvCxnSpPr/>
+          <p:cNvPr id="420" name="OTLSHAPE_T_5c2233aa4cdf471ca3daab9276f651f2_HorizontalConnector1"/>
+          <p:cNvCxnSpPr>
+            <a:cxnSpLocks/>
+          </p:cNvCxnSpPr>
           <p:nvPr>
             <p:custDataLst>
               <p:tags r:id="rId2"/>
@@ -21836,51 +21700,8 @@
         </p:nvCxnSpPr>
         <p:spPr>
           <a:xfrm>
-            <a:off x="576454" y="5120725"/>
-            <a:ext cx="8970811" cy="0"/>
-          </a:xfrm>
-          <a:prstGeom prst="line">
-            <a:avLst/>
-          </a:prstGeom>
-          <a:ln w="9525" cap="flat" cmpd="sng" algn="ctr">
-            <a:solidFill>
-              <a:srgbClr val="CCCCCC"/>
-            </a:solidFill>
-            <a:prstDash val="solid"/>
-            <a:miter lim="800000"/>
-            <a:headEnd type="none" w="med" len="med"/>
-            <a:tailEnd type="none" w="med" len="med"/>
-          </a:ln>
-        </p:spPr>
-        <p:style>
-          <a:lnRef idx="1">
-            <a:schemeClr val="accent1"/>
-          </a:lnRef>
-          <a:fillRef idx="0">
-            <a:schemeClr val="accent1"/>
-          </a:fillRef>
-          <a:effectRef idx="0">
-            <a:schemeClr val="accent1"/>
-          </a:effectRef>
-          <a:fontRef idx="minor">
-            <a:schemeClr val="tx1"/>
-          </a:fontRef>
-        </p:style>
-      </p:cxnSp>
-      <p:cxnSp>
-        <p:nvCxnSpPr>
-          <p:cNvPr id="420" name="OTLSHAPE_T_5c2233aa4cdf471ca3daab9276f651f2_HorizontalConnector1"/>
-          <p:cNvCxnSpPr/>
-          <p:nvPr>
-            <p:custDataLst>
-              <p:tags r:id="rId3"/>
-            </p:custDataLst>
-          </p:nvPr>
-        </p:nvCxnSpPr>
-        <p:spPr>
-          <a:xfrm>
-            <a:off x="576453" y="4800600"/>
-            <a:ext cx="7202395" cy="0"/>
+            <a:off x="838115" y="4220040"/>
+            <a:ext cx="7564572" cy="15704"/>
           </a:xfrm>
           <a:prstGeom prst="line">
             <a:avLst/>
@@ -21913,17 +21734,19 @@
       <p:cxnSp>
         <p:nvCxnSpPr>
           <p:cNvPr id="419" name="OTLSHAPE_T_b833ef56c83441b8aae9f8aa000f05c7_HorizontalConnector1"/>
-          <p:cNvCxnSpPr/>
+          <p:cNvCxnSpPr>
+            <a:cxnSpLocks/>
+          </p:cNvCxnSpPr>
           <p:nvPr>
             <p:custDataLst>
-              <p:tags r:id="rId4"/>
+              <p:tags r:id="rId3"/>
             </p:custDataLst>
           </p:nvPr>
         </p:nvCxnSpPr>
         <p:spPr>
           <a:xfrm>
-            <a:off x="576453" y="4533900"/>
-            <a:ext cx="5548070" cy="0"/>
+            <a:off x="838115" y="3968580"/>
+            <a:ext cx="5776670" cy="0"/>
           </a:xfrm>
           <a:prstGeom prst="line">
             <a:avLst/>
@@ -21956,17 +21779,19 @@
       <p:cxnSp>
         <p:nvCxnSpPr>
           <p:cNvPr id="418" name="OTLSHAPE_T_4c52348678094630a9d20ec801012b57_HorizontalConnector1"/>
-          <p:cNvCxnSpPr/>
+          <p:cNvCxnSpPr>
+            <a:cxnSpLocks/>
+          </p:cNvCxnSpPr>
           <p:nvPr>
             <p:custDataLst>
-              <p:tags r:id="rId5"/>
+              <p:tags r:id="rId4"/>
             </p:custDataLst>
           </p:nvPr>
         </p:nvCxnSpPr>
         <p:spPr>
-          <a:xfrm>
-            <a:off x="576453" y="4267200"/>
-            <a:ext cx="3722608" cy="0"/>
+          <a:xfrm flipV="1">
+            <a:off x="838115" y="3707521"/>
+            <a:ext cx="4284777" cy="15240"/>
           </a:xfrm>
           <a:prstGeom prst="line">
             <a:avLst/>
@@ -21999,17 +21824,19 @@
       <p:cxnSp>
         <p:nvCxnSpPr>
           <p:cNvPr id="417" name="OTLSHAPE_T_f390427816e94984beddb560d3c76b55_HorizontalConnector1"/>
-          <p:cNvCxnSpPr/>
+          <p:cNvCxnSpPr>
+            <a:cxnSpLocks/>
+          </p:cNvCxnSpPr>
           <p:nvPr>
             <p:custDataLst>
-              <p:tags r:id="rId6"/>
+              <p:tags r:id="rId5"/>
             </p:custDataLst>
           </p:nvPr>
         </p:nvCxnSpPr>
         <p:spPr>
           <a:xfrm>
-            <a:off x="576453" y="4000500"/>
-            <a:ext cx="2125329" cy="0"/>
+            <a:off x="838115" y="3489391"/>
+            <a:ext cx="2860781" cy="0"/>
           </a:xfrm>
           <a:prstGeom prst="line">
             <a:avLst/>
@@ -22042,17 +21869,19 @@
       <p:cxnSp>
         <p:nvCxnSpPr>
           <p:cNvPr id="416" name="OTLSHAPE_T_9905d9948fd24916a9eb2ad4b36d189a_HorizontalConnector1"/>
-          <p:cNvCxnSpPr/>
+          <p:cNvCxnSpPr>
+            <a:cxnSpLocks/>
+          </p:cNvCxnSpPr>
           <p:nvPr>
             <p:custDataLst>
-              <p:tags r:id="rId7"/>
+              <p:tags r:id="rId6"/>
             </p:custDataLst>
           </p:nvPr>
         </p:nvCxnSpPr>
         <p:spPr>
-          <a:xfrm>
-            <a:off x="576453" y="3733800"/>
-            <a:ext cx="356912" cy="0"/>
+          <a:xfrm flipV="1">
+            <a:off x="838115" y="3238500"/>
+            <a:ext cx="1894652" cy="2936"/>
           </a:xfrm>
           <a:prstGeom prst="line">
             <a:avLst/>
@@ -22088,13 +21917,13 @@
           <p:cNvCxnSpPr/>
           <p:nvPr>
             <p:custDataLst>
-              <p:tags r:id="rId8"/>
+              <p:tags r:id="rId7"/>
             </p:custDataLst>
           </p:nvPr>
         </p:nvCxnSpPr>
         <p:spPr>
           <a:xfrm>
-            <a:off x="11150894" y="2605828"/>
+            <a:off x="7817687" y="2100782"/>
             <a:ext cx="0" cy="442172"/>
           </a:xfrm>
           <a:prstGeom prst="line">
@@ -22133,13 +21962,13 @@
           <p:cNvCxnSpPr/>
           <p:nvPr>
             <p:custDataLst>
-              <p:tags r:id="rId9"/>
+              <p:tags r:id="rId8"/>
             </p:custDataLst>
           </p:nvPr>
         </p:nvCxnSpPr>
         <p:spPr>
           <a:xfrm>
-            <a:off x="5959736" y="2605828"/>
+            <a:off x="3673496" y="2110527"/>
             <a:ext cx="0" cy="442172"/>
           </a:xfrm>
           <a:prstGeom prst="line">
@@ -22178,14 +22007,14 @@
           <p:cNvSpPr txBox="1"/>
           <p:nvPr>
             <p:custDataLst>
-              <p:tags r:id="rId10"/>
+              <p:tags r:id="rId9"/>
             </p:custDataLst>
           </p:nvPr>
         </p:nvSpPr>
         <p:spPr>
           <a:xfrm>
-            <a:off x="317500" y="3098969"/>
-            <a:ext cx="451662" cy="279061"/>
+            <a:off x="230140" y="2604700"/>
+            <a:ext cx="448584" cy="276999"/>
           </a:xfrm>
           <a:prstGeom prst="rect">
             <a:avLst/>
@@ -22200,20 +22029,14 @@
           <a:p>
             <a:pPr algn="ctr"/>
             <a:r>
-              <a:rPr lang="es-PA" b="1" spc="-38" smtClean="0">
+              <a:rPr lang="es-PA" b="1" spc="-38" dirty="0">
                 <a:solidFill>
                   <a:srgbClr val="ED7D31"/>
                 </a:solidFill>
                 <a:latin typeface="Calibri" panose="020F0502020204030204" pitchFamily="34" charset="0"/>
               </a:rPr>
-              <a:t>2018</a:t>
+              <a:t>2020</a:t>
             </a:r>
-            <a:endParaRPr lang="es-PA" b="1" spc="-38">
-              <a:solidFill>
-                <a:srgbClr val="ED7D31"/>
-              </a:solidFill>
-              <a:latin typeface="Calibri" panose="020F0502020204030204" pitchFamily="34" charset="0"/>
-            </a:endParaRPr>
           </a:p>
         </p:txBody>
       </p:sp>
@@ -22223,14 +22046,14 @@
           <p:cNvSpPr txBox="1"/>
           <p:nvPr>
             <p:custDataLst>
-              <p:tags r:id="rId11"/>
+              <p:tags r:id="rId10"/>
             </p:custDataLst>
           </p:nvPr>
         </p:nvSpPr>
         <p:spPr>
           <a:xfrm>
-            <a:off x="11411034" y="3098969"/>
-            <a:ext cx="451662" cy="279061"/>
+            <a:off x="11323674" y="2604700"/>
+            <a:ext cx="448584" cy="276999"/>
           </a:xfrm>
           <a:prstGeom prst="rect">
             <a:avLst/>
@@ -22245,20 +22068,14 @@
           <a:p>
             <a:pPr algn="ctr"/>
             <a:r>
-              <a:rPr lang="es-PA" b="1" spc="-38" smtClean="0">
+              <a:rPr lang="es-PA" b="1" spc="-38" dirty="0">
                 <a:solidFill>
                   <a:srgbClr val="ED7D31"/>
                 </a:solidFill>
                 <a:latin typeface="Calibri" panose="020F0502020204030204" pitchFamily="34" charset="0"/>
               </a:rPr>
-              <a:t>2018</a:t>
+              <a:t>2021</a:t>
             </a:r>
-            <a:endParaRPr lang="es-PA" b="1" spc="-38">
-              <a:solidFill>
-                <a:srgbClr val="ED7D31"/>
-              </a:solidFill>
-              <a:latin typeface="Calibri" panose="020F0502020204030204" pitchFamily="34" charset="0"/>
-            </a:endParaRPr>
           </a:p>
         </p:txBody>
       </p:sp>
@@ -22268,13 +22085,13 @@
           <p:cNvSpPr/>
           <p:nvPr>
             <p:custDataLst>
-              <p:tags r:id="rId12"/>
+              <p:tags r:id="rId11"/>
             </p:custDataLst>
           </p:nvPr>
         </p:nvSpPr>
         <p:spPr>
           <a:xfrm>
-            <a:off x="933365" y="3048000"/>
+            <a:off x="838115" y="2552700"/>
             <a:ext cx="10337800" cy="381000"/>
           </a:xfrm>
           <a:prstGeom prst="rect">
@@ -22344,7 +22161,7 @@
           <a:lstStyle/>
           <a:p>
             <a:pPr algn="ctr"/>
-            <a:endParaRPr lang="es-PA"/>
+            <a:endParaRPr lang="es-PA" dirty="0"/>
           </a:p>
         </p:txBody>
       </p:sp>
@@ -22354,7 +22171,7 @@
           <p:cNvSpPr/>
           <p:nvPr>
             <p:custDataLst>
-              <p:tags r:id="rId13"/>
+              <p:tags r:id="rId12"/>
             </p:custDataLst>
           </p:nvPr>
         </p:nvSpPr>
@@ -22398,7 +22215,7 @@
           <p:cNvSpPr/>
           <p:nvPr>
             <p:custDataLst>
-              <p:tags r:id="rId14"/>
+              <p:tags r:id="rId13"/>
             </p:custDataLst>
           </p:nvPr>
         </p:nvSpPr>
@@ -22442,7 +22259,7 @@
           <p:cNvSpPr txBox="1"/>
           <p:nvPr>
             <p:custDataLst>
-              <p:tags r:id="rId15"/>
+              <p:tags r:id="rId14"/>
             </p:custDataLst>
           </p:nvPr>
         </p:nvSpPr>
@@ -22464,7 +22281,7 @@
           <a:p>
             <a:pPr algn="ctr"/>
             <a:r>
-              <a:rPr lang="es-PA" sz="1200" smtClean="0">
+              <a:rPr lang="es-PA" sz="1200">
                 <a:solidFill>
                   <a:schemeClr val="dk2"/>
                 </a:solidFill>
@@ -22472,56 +22289,6 @@
               </a:rPr>
               <a:t>Hoy</a:t>
             </a:r>
-            <a:endParaRPr lang="es-PA" sz="1200">
-              <a:solidFill>
-                <a:schemeClr val="dk2"/>
-              </a:solidFill>
-              <a:latin typeface="Calibri" panose="020F0502020204030204" pitchFamily="34" charset="0"/>
-            </a:endParaRPr>
-          </a:p>
-        </p:txBody>
-      </p:sp>
-      <p:sp>
-        <p:nvSpPr>
-          <p:cNvPr id="403" name="OTLSHAPE_TB_00000000000000000000000000000000_TimescaleInterval1"/>
-          <p:cNvSpPr txBox="1"/>
-          <p:nvPr>
-            <p:custDataLst>
-              <p:tags r:id="rId16"/>
-            </p:custDataLst>
-          </p:nvPr>
-        </p:nvSpPr>
-        <p:spPr>
-          <a:xfrm>
-            <a:off x="996865" y="3145473"/>
-            <a:ext cx="268407" cy="186055"/>
-          </a:xfrm>
-          <a:prstGeom prst="rect">
-            <a:avLst/>
-          </a:prstGeom>
-          <a:noFill/>
-        </p:spPr>
-        <p:txBody>
-          <a:bodyPr vert="horz" wrap="none" lIns="0" tIns="0" rIns="0" bIns="0" rtlCol="0" anchor="ctr" anchorCtr="0">
-            <a:noAutofit/>
-          </a:bodyPr>
-          <a:lstStyle/>
-          <a:p>
-            <a:r>
-              <a:rPr lang="es-PA" sz="1200" spc="-16" smtClean="0">
-                <a:solidFill>
-                  <a:schemeClr val="lt1"/>
-                </a:solidFill>
-                <a:latin typeface="Calibri" panose="020F0502020204030204" pitchFamily="34" charset="0"/>
-              </a:rPr>
-              <a:t>ene.</a:t>
-            </a:r>
-            <a:endParaRPr lang="es-PA" sz="1200" spc="-16">
-              <a:solidFill>
-                <a:schemeClr val="lt1"/>
-              </a:solidFill>
-              <a:latin typeface="Calibri" panose="020F0502020204030204" pitchFamily="34" charset="0"/>
-            </a:endParaRPr>
           </a:p>
         </p:txBody>
       </p:sp>
@@ -22531,13 +22298,13 @@
           <p:cNvCxnSpPr/>
           <p:nvPr>
             <p:custDataLst>
-              <p:tags r:id="rId17"/>
+              <p:tags r:id="rId15"/>
             </p:custDataLst>
           </p:nvPr>
         </p:nvCxnSpPr>
         <p:spPr>
           <a:xfrm>
-            <a:off x="2701781" y="3136900"/>
+            <a:off x="3477116" y="2633028"/>
             <a:ext cx="0" cy="203200"/>
           </a:xfrm>
           <a:prstGeom prst="line">
@@ -22576,14 +22343,14 @@
           <p:cNvSpPr txBox="1"/>
           <p:nvPr>
             <p:custDataLst>
-              <p:tags r:id="rId18"/>
+              <p:tags r:id="rId16"/>
             </p:custDataLst>
           </p:nvPr>
         </p:nvSpPr>
         <p:spPr>
           <a:xfrm>
-            <a:off x="2765282" y="3145473"/>
-            <a:ext cx="232051" cy="186055"/>
+            <a:off x="3505825" y="2631408"/>
+            <a:ext cx="732295" cy="186055"/>
           </a:xfrm>
           <a:prstGeom prst="rect">
             <a:avLst/>
@@ -22597,81 +22364,30 @@
           <a:lstStyle/>
           <a:p>
             <a:r>
-              <a:rPr lang="es-PA" sz="1200" spc="-14" smtClean="0">
+              <a:rPr lang="es-PA" sz="1200" spc="-14" dirty="0">
                 <a:solidFill>
                   <a:schemeClr val="lt1"/>
                 </a:solidFill>
                 <a:latin typeface="Calibri" panose="020F0502020204030204" pitchFamily="34" charset="0"/>
               </a:rPr>
-              <a:t>feb.</a:t>
+              <a:t>Diciembre</a:t>
             </a:r>
-            <a:endParaRPr lang="es-PA" sz="1200" spc="-14">
-              <a:solidFill>
-                <a:schemeClr val="lt1"/>
-              </a:solidFill>
-              <a:latin typeface="Calibri" panose="020F0502020204030204" pitchFamily="34" charset="0"/>
-            </a:endParaRPr>
           </a:p>
         </p:txBody>
       </p:sp>
-      <p:cxnSp>
-        <p:nvCxnSpPr>
-          <p:cNvPr id="406" name="OTLSHAPE_TB_00000000000000000000000000000000_Separator2"/>
-          <p:cNvCxnSpPr/>
-          <p:nvPr>
-            <p:custDataLst>
-              <p:tags r:id="rId19"/>
-            </p:custDataLst>
-          </p:nvPr>
-        </p:nvCxnSpPr>
-        <p:spPr>
-          <a:xfrm>
-            <a:off x="4299060" y="3136900"/>
-            <a:ext cx="0" cy="203200"/>
-          </a:xfrm>
-          <a:prstGeom prst="line">
-            <a:avLst/>
-          </a:prstGeom>
-          <a:ln w="6350" cap="flat" cmpd="sng" algn="ctr">
-            <a:solidFill>
-              <a:schemeClr val="lt1">
-                <a:alpha val="29804"/>
-              </a:schemeClr>
-            </a:solidFill>
-            <a:prstDash val="solid"/>
-            <a:miter lim="800000"/>
-            <a:headEnd type="none" w="med" len="med"/>
-            <a:tailEnd type="none" w="med" len="med"/>
-          </a:ln>
-        </p:spPr>
-        <p:style>
-          <a:lnRef idx="1">
-            <a:schemeClr val="accent1"/>
-          </a:lnRef>
-          <a:fillRef idx="0">
-            <a:schemeClr val="accent1"/>
-          </a:fillRef>
-          <a:effectRef idx="0">
-            <a:schemeClr val="accent1"/>
-          </a:effectRef>
-          <a:fontRef idx="minor">
-            <a:schemeClr val="tx1"/>
-          </a:fontRef>
-        </p:style>
-      </p:cxnSp>
       <p:sp>
         <p:nvSpPr>
           <p:cNvPr id="407" name="OTLSHAPE_TB_00000000000000000000000000000000_TimescaleInterval3"/>
           <p:cNvSpPr txBox="1"/>
           <p:nvPr>
             <p:custDataLst>
-              <p:tags r:id="rId20"/>
+              <p:tags r:id="rId17"/>
             </p:custDataLst>
           </p:nvPr>
         </p:nvSpPr>
         <p:spPr>
           <a:xfrm>
-            <a:off x="4362561" y="3145473"/>
+            <a:off x="907966" y="2686368"/>
             <a:ext cx="267958" cy="186055"/>
           </a:xfrm>
           <a:prstGeom prst="rect">
@@ -22686,20 +22402,14 @@
           <a:lstStyle/>
           <a:p>
             <a:r>
-              <a:rPr lang="es-PA" sz="1200" spc="-16" smtClean="0">
+              <a:rPr lang="es-PA" sz="1200" spc="-16" dirty="0">
                 <a:solidFill>
                   <a:schemeClr val="lt1"/>
                 </a:solidFill>
                 <a:latin typeface="Calibri" panose="020F0502020204030204" pitchFamily="34" charset="0"/>
               </a:rPr>
-              <a:t>mar.</a:t>
+              <a:t>Noviembre</a:t>
             </a:r>
-            <a:endParaRPr lang="es-PA" sz="1200" spc="-16">
-              <a:solidFill>
-                <a:schemeClr val="lt1"/>
-              </a:solidFill>
-              <a:latin typeface="Calibri" panose="020F0502020204030204" pitchFamily="34" charset="0"/>
-            </a:endParaRPr>
           </a:p>
         </p:txBody>
       </p:sp>
@@ -22709,13 +22419,13 @@
           <p:cNvCxnSpPr/>
           <p:nvPr>
             <p:custDataLst>
-              <p:tags r:id="rId21"/>
+              <p:tags r:id="rId18"/>
             </p:custDataLst>
           </p:nvPr>
         </p:nvCxnSpPr>
         <p:spPr>
           <a:xfrm>
-            <a:off x="6067477" y="3136900"/>
+            <a:off x="6462345" y="2624455"/>
             <a:ext cx="0" cy="203200"/>
           </a:xfrm>
           <a:prstGeom prst="line">
@@ -22754,13 +22464,13 @@
           <p:cNvSpPr txBox="1"/>
           <p:nvPr>
             <p:custDataLst>
-              <p:tags r:id="rId22"/>
+              <p:tags r:id="rId19"/>
             </p:custDataLst>
           </p:nvPr>
         </p:nvSpPr>
         <p:spPr>
           <a:xfrm>
-            <a:off x="6130977" y="3145473"/>
+            <a:off x="6525845" y="2633028"/>
             <a:ext cx="229807" cy="186055"/>
           </a:xfrm>
           <a:prstGeom prst="rect">
@@ -22775,20 +22485,14 @@
           <a:lstStyle/>
           <a:p>
             <a:r>
-              <a:rPr lang="es-PA" sz="1200" spc="-14" smtClean="0">
+              <a:rPr lang="es-PA" sz="1200" spc="-14" dirty="0">
                 <a:solidFill>
                   <a:schemeClr val="lt1"/>
                 </a:solidFill>
                 <a:latin typeface="Calibri" panose="020F0502020204030204" pitchFamily="34" charset="0"/>
               </a:rPr>
-              <a:t>abr.</a:t>
+              <a:t>Enero</a:t>
             </a:r>
-            <a:endParaRPr lang="es-PA" sz="1200" spc="-14">
-              <a:solidFill>
-                <a:schemeClr val="lt1"/>
-              </a:solidFill>
-              <a:latin typeface="Calibri" panose="020F0502020204030204" pitchFamily="34" charset="0"/>
-            </a:endParaRPr>
           </a:p>
         </p:txBody>
       </p:sp>
@@ -22798,13 +22502,13 @@
           <p:cNvCxnSpPr/>
           <p:nvPr>
             <p:custDataLst>
-              <p:tags r:id="rId23"/>
+              <p:tags r:id="rId20"/>
             </p:custDataLst>
           </p:nvPr>
         </p:nvCxnSpPr>
         <p:spPr>
           <a:xfrm>
-            <a:off x="7778848" y="3136900"/>
+            <a:off x="9206328" y="2641600"/>
             <a:ext cx="0" cy="203200"/>
           </a:xfrm>
           <a:prstGeom prst="line">
@@ -22843,13 +22547,13 @@
           <p:cNvSpPr txBox="1"/>
           <p:nvPr>
             <p:custDataLst>
-              <p:tags r:id="rId24"/>
+              <p:tags r:id="rId21"/>
             </p:custDataLst>
           </p:nvPr>
         </p:nvSpPr>
         <p:spPr>
           <a:xfrm>
-            <a:off x="7842348" y="3145473"/>
+            <a:off x="9269828" y="2650173"/>
             <a:ext cx="292100" cy="186055"/>
           </a:xfrm>
           <a:prstGeom prst="rect">
@@ -22864,109 +22568,14 @@
           <a:lstStyle/>
           <a:p>
             <a:r>
-              <a:rPr lang="es-PA" sz="1200" spc="-16" smtClean="0">
+              <a:rPr lang="es-PA" sz="1200" spc="-16" dirty="0">
                 <a:solidFill>
                   <a:schemeClr val="lt1"/>
                 </a:solidFill>
                 <a:latin typeface="Calibri" panose="020F0502020204030204" pitchFamily="34" charset="0"/>
               </a:rPr>
-              <a:t>may.</a:t>
+              <a:t>Febrero</a:t>
             </a:r>
-            <a:endParaRPr lang="es-PA" sz="1200" spc="-16">
-              <a:solidFill>
-                <a:schemeClr val="lt1"/>
-              </a:solidFill>
-              <a:latin typeface="Calibri" panose="020F0502020204030204" pitchFamily="34" charset="0"/>
-            </a:endParaRPr>
-          </a:p>
-        </p:txBody>
-      </p:sp>
-      <p:cxnSp>
-        <p:nvCxnSpPr>
-          <p:cNvPr id="412" name="OTLSHAPE_TB_00000000000000000000000000000000_Separator5"/>
-          <p:cNvCxnSpPr/>
-          <p:nvPr>
-            <p:custDataLst>
-              <p:tags r:id="rId25"/>
-            </p:custDataLst>
-          </p:nvPr>
-        </p:nvCxnSpPr>
-        <p:spPr>
-          <a:xfrm>
-            <a:off x="9547264" y="3136900"/>
-            <a:ext cx="0" cy="203200"/>
-          </a:xfrm>
-          <a:prstGeom prst="line">
-            <a:avLst/>
-          </a:prstGeom>
-          <a:ln w="6350" cap="flat" cmpd="sng" algn="ctr">
-            <a:solidFill>
-              <a:schemeClr val="lt1">
-                <a:alpha val="29804"/>
-              </a:schemeClr>
-            </a:solidFill>
-            <a:prstDash val="solid"/>
-            <a:miter lim="800000"/>
-            <a:headEnd type="none" w="med" len="med"/>
-            <a:tailEnd type="none" w="med" len="med"/>
-          </a:ln>
-        </p:spPr>
-        <p:style>
-          <a:lnRef idx="1">
-            <a:schemeClr val="accent1"/>
-          </a:lnRef>
-          <a:fillRef idx="0">
-            <a:schemeClr val="accent1"/>
-          </a:fillRef>
-          <a:effectRef idx="0">
-            <a:schemeClr val="accent1"/>
-          </a:effectRef>
-          <a:fontRef idx="minor">
-            <a:schemeClr val="tx1"/>
-          </a:fontRef>
-        </p:style>
-      </p:cxnSp>
-      <p:sp>
-        <p:nvSpPr>
-          <p:cNvPr id="413" name="OTLSHAPE_TB_00000000000000000000000000000000_TimescaleInterval6"/>
-          <p:cNvSpPr txBox="1"/>
-          <p:nvPr>
-            <p:custDataLst>
-              <p:tags r:id="rId26"/>
-            </p:custDataLst>
-          </p:nvPr>
-        </p:nvSpPr>
-        <p:spPr>
-          <a:xfrm>
-            <a:off x="9610765" y="3145473"/>
-            <a:ext cx="231538" cy="186055"/>
-          </a:xfrm>
-          <a:prstGeom prst="rect">
-            <a:avLst/>
-          </a:prstGeom>
-          <a:noFill/>
-        </p:spPr>
-        <p:txBody>
-          <a:bodyPr vert="horz" wrap="none" lIns="0" tIns="0" rIns="0" bIns="0" rtlCol="0" anchor="ctr" anchorCtr="0">
-            <a:noAutofit/>
-          </a:bodyPr>
-          <a:lstStyle/>
-          <a:p>
-            <a:r>
-              <a:rPr lang="es-PA" sz="1200" spc="-14" smtClean="0">
-                <a:solidFill>
-                  <a:schemeClr val="lt1"/>
-                </a:solidFill>
-                <a:latin typeface="Calibri" panose="020F0502020204030204" pitchFamily="34" charset="0"/>
-              </a:rPr>
-              <a:t>jun.</a:t>
-            </a:r>
-            <a:endParaRPr lang="es-PA" sz="1200" spc="-14">
-              <a:solidFill>
-                <a:schemeClr val="lt1"/>
-              </a:solidFill>
-              <a:latin typeface="Calibri" panose="020F0502020204030204" pitchFamily="34" charset="0"/>
-            </a:endParaRPr>
           </a:p>
         </p:txBody>
       </p:sp>
@@ -22976,13 +22585,13 @@
           <p:cNvSpPr txBox="1"/>
           <p:nvPr>
             <p:custDataLst>
-              <p:tags r:id="rId27"/>
+              <p:tags r:id="rId22"/>
             </p:custDataLst>
           </p:nvPr>
         </p:nvSpPr>
         <p:spPr>
           <a:xfrm>
-            <a:off x="6181986" y="2493857"/>
+            <a:off x="3918154" y="2075836"/>
             <a:ext cx="660400" cy="170519"/>
           </a:xfrm>
           <a:prstGeom prst="rect">
@@ -22997,7 +22606,7 @@
           <a:lstStyle/>
           <a:p>
             <a:r>
-              <a:rPr lang="es-PA" sz="1100" b="1" spc="-8" smtClean="0">
+              <a:rPr lang="es-PA" sz="1100" b="1" spc="-8">
                 <a:solidFill>
                   <a:schemeClr val="dk2"/>
                 </a:solidFill>
@@ -23005,12 +22614,6 @@
               </a:rPr>
               <a:t>Release 1.0</a:t>
             </a:r>
-            <a:endParaRPr lang="es-PA" sz="1100" b="1" spc="-8">
-              <a:solidFill>
-                <a:schemeClr val="dk2"/>
-              </a:solidFill>
-              <a:latin typeface="Calibri" panose="020F0502020204030204" pitchFamily="34" charset="0"/>
-            </a:endParaRPr>
           </a:p>
         </p:txBody>
       </p:sp>
@@ -23020,14 +22623,14 @@
           <p:cNvSpPr txBox="1"/>
           <p:nvPr>
             <p:custDataLst>
-              <p:tags r:id="rId28"/>
+              <p:tags r:id="rId23"/>
             </p:custDataLst>
           </p:nvPr>
         </p:nvSpPr>
         <p:spPr>
           <a:xfrm>
-            <a:off x="6181986" y="2677075"/>
-            <a:ext cx="558800" cy="155025"/>
+            <a:off x="3918163" y="2287765"/>
+            <a:ext cx="660391" cy="153888"/>
           </a:xfrm>
           <a:prstGeom prst="rect">
             <a:avLst/>
@@ -23041,20 +22644,14 @@
           <a:lstStyle/>
           <a:p>
             <a:r>
-              <a:rPr lang="es-PA" sz="1000" spc="-8" smtClean="0">
+              <a:rPr lang="es-PA" sz="1000" spc="-8" dirty="0">
                 <a:solidFill>
                   <a:srgbClr val="44546A"/>
                 </a:solidFill>
                 <a:latin typeface="Calibri" panose="020F0502020204030204" pitchFamily="34" charset="0"/>
               </a:rPr>
-              <a:t>3/30/2018</a:t>
+              <a:t>2 Diciembre</a:t>
             </a:r>
-            <a:endParaRPr lang="es-PA" sz="1000" spc="-8">
-              <a:solidFill>
-                <a:srgbClr val="44546A"/>
-              </a:solidFill>
-              <a:latin typeface="Calibri" panose="020F0502020204030204" pitchFamily="34" charset="0"/>
-            </a:endParaRPr>
           </a:p>
         </p:txBody>
       </p:sp>
@@ -23064,20 +22661,22 @@
           <p:cNvSpPr/>
           <p:nvPr>
             <p:custDataLst>
-              <p:tags r:id="rId29"/>
+              <p:tags r:id="rId24"/>
             </p:custDataLst>
           </p:nvPr>
         </p:nvSpPr>
         <p:spPr>
           <a:xfrm rot="16200000">
-            <a:off x="5985136" y="2605828"/>
+            <a:off x="3698896" y="2120854"/>
             <a:ext cx="165100" cy="165100"/>
           </a:xfrm>
           <a:prstGeom prst="flowChartMerge">
             <a:avLst/>
           </a:prstGeom>
           <a:solidFill>
-            <a:srgbClr val="EA161E"/>
+            <a:schemeClr val="accent2">
+              <a:lumMod val="75000"/>
+            </a:schemeClr>
           </a:solidFill>
           <a:ln w="12700" cap="flat" cmpd="sng" algn="ctr">
             <a:noFill/>
@@ -23093,28 +22692,6 @@
             <a:bevelT h="12700"/>
           </a:sp3d>
           <a:extLst>
-            <a:ext uri="{91240B29-F687-4F45-9708-019B960494DF}">
-              <a14:hiddenLine xmlns:a14="http://schemas.microsoft.com/office/drawing/2010/main" w="12700" cap="flat" cmpd="sng" algn="ctr">
-                <a:solidFill>
-                  <a:schemeClr val="accent1">
-                    <a:shade val="50000"/>
-                  </a:schemeClr>
-                </a:solidFill>
-                <a:prstDash val="solid"/>
-                <a:miter lim="800000"/>
-              </a14:hiddenLine>
-            </a:ext>
-            <a:ext uri="{AF507438-7753-43E0-B8FC-AC1667EBCBE1}">
-              <a14:hiddenEffects xmlns:a14="http://schemas.microsoft.com/office/drawing/2010/main">
-                <a:effectLst>
-                  <a:outerShdw>
-                    <a:scrgbClr r="0" g="0" b="0">
-                      <a:alpha val="50000"/>
-                    </a:scrgbClr>
-                  </a:outerShdw>
-                </a:effectLst>
-              </a14:hiddenEffects>
-            </a:ext>
             <a:ext uri="{53640926-AAD7-44D8-BBD7-CCE9431645EC}">
               <a14:shadowObscured xmlns:a14="http://schemas.microsoft.com/office/drawing/2010/main" val="1"/>
             </a:ext>
@@ -23151,13 +22728,13 @@
           <p:cNvSpPr txBox="1"/>
           <p:nvPr>
             <p:custDataLst>
-              <p:tags r:id="rId30"/>
+              <p:tags r:id="rId25"/>
             </p:custDataLst>
           </p:nvPr>
         </p:nvSpPr>
         <p:spPr>
           <a:xfrm>
-            <a:off x="11373144" y="2493857"/>
+            <a:off x="8024736" y="2152944"/>
             <a:ext cx="660400" cy="170519"/>
           </a:xfrm>
           <a:prstGeom prst="rect">
@@ -23172,20 +22749,23 @@
           <a:lstStyle/>
           <a:p>
             <a:r>
-              <a:rPr lang="es-PA" sz="1100" b="1" spc="-8" smtClean="0">
+              <a:rPr lang="es-PA" sz="1100" b="1" spc="-8" dirty="0" err="1">
                 <a:solidFill>
                   <a:schemeClr val="dk2"/>
                 </a:solidFill>
                 <a:latin typeface="Calibri" panose="020F0502020204030204" pitchFamily="34" charset="0"/>
               </a:rPr>
-              <a:t>Release 2.0</a:t>
+              <a:t>Release</a:t>
             </a:r>
-            <a:endParaRPr lang="es-PA" sz="1100" b="1" spc="-8">
-              <a:solidFill>
-                <a:schemeClr val="dk2"/>
-              </a:solidFill>
-              <a:latin typeface="Calibri" panose="020F0502020204030204" pitchFamily="34" charset="0"/>
-            </a:endParaRPr>
+            <a:r>
+              <a:rPr lang="es-PA" sz="1100" b="1" spc="-8" dirty="0">
+                <a:solidFill>
+                  <a:schemeClr val="dk2"/>
+                </a:solidFill>
+                <a:latin typeface="Calibri" panose="020F0502020204030204" pitchFamily="34" charset="0"/>
+              </a:rPr>
+              <a:t> 2.0</a:t>
+            </a:r>
           </a:p>
         </p:txBody>
       </p:sp>
@@ -23195,14 +22775,14 @@
           <p:cNvSpPr txBox="1"/>
           <p:nvPr>
             <p:custDataLst>
-              <p:tags r:id="rId31"/>
+              <p:tags r:id="rId26"/>
             </p:custDataLst>
           </p:nvPr>
         </p:nvSpPr>
         <p:spPr>
           <a:xfrm>
-            <a:off x="11373144" y="2677075"/>
-            <a:ext cx="558800" cy="155025"/>
+            <a:off x="8018249" y="2321868"/>
+            <a:ext cx="558800" cy="153888"/>
           </a:xfrm>
           <a:prstGeom prst="rect">
             <a:avLst/>
@@ -23216,20 +22796,14 @@
           <a:lstStyle/>
           <a:p>
             <a:r>
-              <a:rPr lang="es-PA" sz="1000" spc="-8" smtClean="0">
+              <a:rPr lang="es-PA" sz="1000" spc="-8" dirty="0">
                 <a:solidFill>
                   <a:srgbClr val="44546A"/>
                 </a:solidFill>
                 <a:latin typeface="Calibri" panose="020F0502020204030204" pitchFamily="34" charset="0"/>
               </a:rPr>
-              <a:t>6/29/2018</a:t>
+              <a:t>14 Enero</a:t>
             </a:r>
-            <a:endParaRPr lang="es-PA" sz="1000" spc="-8">
-              <a:solidFill>
-                <a:srgbClr val="44546A"/>
-              </a:solidFill>
-              <a:latin typeface="Calibri" panose="020F0502020204030204" pitchFamily="34" charset="0"/>
-            </a:endParaRPr>
           </a:p>
         </p:txBody>
       </p:sp>
@@ -23239,20 +22813,22 @@
           <p:cNvSpPr/>
           <p:nvPr>
             <p:custDataLst>
-              <p:tags r:id="rId32"/>
+              <p:tags r:id="rId27"/>
             </p:custDataLst>
           </p:nvPr>
         </p:nvSpPr>
         <p:spPr>
           <a:xfrm rot="16200000">
-            <a:off x="11176294" y="2605828"/>
+            <a:off x="7852530" y="2120854"/>
             <a:ext cx="165100" cy="165100"/>
           </a:xfrm>
           <a:prstGeom prst="flowChartMerge">
             <a:avLst/>
           </a:prstGeom>
           <a:solidFill>
-            <a:srgbClr val="EA161E"/>
+            <a:schemeClr val="accent4">
+              <a:lumMod val="75000"/>
+            </a:schemeClr>
           </a:solidFill>
           <a:ln w="12700" cap="flat" cmpd="sng" algn="ctr">
             <a:noFill/>
@@ -23268,28 +22844,6 @@
             <a:bevelT h="12700"/>
           </a:sp3d>
           <a:extLst>
-            <a:ext uri="{91240B29-F687-4F45-9708-019B960494DF}">
-              <a14:hiddenLine xmlns:a14="http://schemas.microsoft.com/office/drawing/2010/main" w="12700" cap="flat" cmpd="sng" algn="ctr">
-                <a:solidFill>
-                  <a:schemeClr val="accent1">
-                    <a:shade val="50000"/>
-                  </a:schemeClr>
-                </a:solidFill>
-                <a:prstDash val="solid"/>
-                <a:miter lim="800000"/>
-              </a14:hiddenLine>
-            </a:ext>
-            <a:ext uri="{AF507438-7753-43E0-B8FC-AC1667EBCBE1}">
-              <a14:hiddenEffects xmlns:a14="http://schemas.microsoft.com/office/drawing/2010/main">
-                <a:effectLst>
-                  <a:outerShdw>
-                    <a:scrgbClr r="0" g="0" b="0">
-                      <a:alpha val="50000"/>
-                    </a:scrgbClr>
-                  </a:outerShdw>
-                </a:effectLst>
-              </a14:hiddenEffects>
-            </a:ext>
             <a:ext uri="{53640926-AAD7-44D8-BBD7-CCE9431645EC}">
               <a14:shadowObscured xmlns:a14="http://schemas.microsoft.com/office/drawing/2010/main" val="1"/>
             </a:ext>
@@ -23326,20 +22880,23 @@
           <p:cNvSpPr/>
           <p:nvPr>
             <p:custDataLst>
-              <p:tags r:id="rId33"/>
+              <p:tags r:id="rId28"/>
             </p:custDataLst>
           </p:nvPr>
         </p:nvSpPr>
         <p:spPr>
           <a:xfrm>
-            <a:off x="933365" y="3632200"/>
-            <a:ext cx="1778000" cy="203200"/>
+            <a:off x="2732767" y="3087549"/>
+            <a:ext cx="905058" cy="153887"/>
           </a:xfrm>
           <a:prstGeom prst="rect">
             <a:avLst/>
           </a:prstGeom>
           <a:solidFill>
-            <a:srgbClr val="5B9BD5"/>
+            <a:schemeClr val="accent2">
+              <a:lumMod val="40000"/>
+              <a:lumOff val="60000"/>
+            </a:schemeClr>
           </a:solidFill>
           <a:ln w="12700" cap="flat" cmpd="sng" algn="ctr">
             <a:noFill/>
@@ -23357,28 +22914,6 @@
             <a:bevelT w="165100" h="12700"/>
           </a:sp3d>
           <a:extLst>
-            <a:ext uri="{91240B29-F687-4F45-9708-019B960494DF}">
-              <a14:hiddenLine xmlns:a14="http://schemas.microsoft.com/office/drawing/2010/main" w="12700" cap="flat" cmpd="sng" algn="ctr">
-                <a:solidFill>
-                  <a:schemeClr val="accent1">
-                    <a:shade val="50000"/>
-                  </a:schemeClr>
-                </a:solidFill>
-                <a:prstDash val="solid"/>
-                <a:miter lim="800000"/>
-              </a14:hiddenLine>
-            </a:ext>
-            <a:ext uri="{AF507438-7753-43E0-B8FC-AC1667EBCBE1}">
-              <a14:hiddenEffects xmlns:a14="http://schemas.microsoft.com/office/drawing/2010/main">
-                <a:effectLst>
-                  <a:outerShdw>
-                    <a:scrgbClr r="0" g="0" b="0">
-                      <a:alpha val="50000"/>
-                    </a:scrgbClr>
-                  </a:outerShdw>
-                </a:effectLst>
-              </a14:hiddenEffects>
-            </a:ext>
             <a:ext uri="{53640926-AAD7-44D8-BBD7-CCE9431645EC}">
               <a14:shadowObscured xmlns:a14="http://schemas.microsoft.com/office/drawing/2010/main" val="1"/>
             </a:ext>
@@ -23415,7 +22950,7 @@
           <p:cNvSpPr/>
           <p:nvPr>
             <p:custDataLst>
-              <p:tags r:id="rId34"/>
+              <p:tags r:id="rId29"/>
             </p:custDataLst>
           </p:nvPr>
         </p:nvSpPr>
@@ -23459,7 +22994,7 @@
           <p:cNvSpPr txBox="1"/>
           <p:nvPr>
             <p:custDataLst>
-              <p:tags r:id="rId35"/>
+              <p:tags r:id="rId30"/>
             </p:custDataLst>
           </p:nvPr>
         </p:nvSpPr>
@@ -23481,7 +23016,7 @@
           <a:p>
             <a:pPr algn="ctr"/>
             <a:r>
-              <a:rPr lang="es-PA" sz="1000" smtClean="0">
+              <a:rPr lang="es-PA" sz="1000">
                 <a:solidFill>
                   <a:srgbClr val="ED7D31"/>
                 </a:solidFill>
@@ -23489,12 +23024,6 @@
               </a:rPr>
               <a:t>31 días</a:t>
             </a:r>
-            <a:endParaRPr lang="es-PA" sz="1000">
-              <a:solidFill>
-                <a:srgbClr val="ED7D31"/>
-              </a:solidFill>
-              <a:latin typeface="Calibri" panose="020F0502020204030204" pitchFamily="34" charset="0"/>
-            </a:endParaRPr>
           </a:p>
         </p:txBody>
       </p:sp>
@@ -23504,7 +23033,7 @@
           <p:cNvSpPr txBox="1"/>
           <p:nvPr>
             <p:custDataLst>
-              <p:tags r:id="rId36"/>
+              <p:tags r:id="rId31"/>
             </p:custDataLst>
           </p:nvPr>
         </p:nvSpPr>
@@ -23540,7 +23069,7 @@
           <p:cNvSpPr txBox="1"/>
           <p:nvPr>
             <p:custDataLst>
-              <p:tags r:id="rId37"/>
+              <p:tags r:id="rId32"/>
             </p:custDataLst>
           </p:nvPr>
         </p:nvSpPr>
@@ -23576,7 +23105,7 @@
           <p:cNvSpPr txBox="1"/>
           <p:nvPr>
             <p:custDataLst>
-              <p:tags r:id="rId38"/>
+              <p:tags r:id="rId33"/>
             </p:custDataLst>
           </p:nvPr>
         </p:nvSpPr>
@@ -23612,14 +23141,14 @@
           <p:cNvSpPr txBox="1"/>
           <p:nvPr>
             <p:custDataLst>
-              <p:tags r:id="rId39"/>
+              <p:tags r:id="rId34"/>
             </p:custDataLst>
           </p:nvPr>
         </p:nvSpPr>
         <p:spPr>
           <a:xfrm>
-            <a:off x="2752542" y="3656288"/>
-            <a:ext cx="1130300" cy="155025"/>
+            <a:off x="3673496" y="3076434"/>
+            <a:ext cx="905058" cy="153888"/>
           </a:xfrm>
           <a:prstGeom prst="rect">
             <a:avLst/>
@@ -23633,20 +23162,14 @@
           <a:lstStyle/>
           <a:p>
             <a:r>
-              <a:rPr lang="es-PA" sz="1000" spc="-6" smtClean="0">
+              <a:rPr lang="es-PA" sz="1000" spc="-6" dirty="0">
                 <a:solidFill>
                   <a:srgbClr val="44546A"/>
                 </a:solidFill>
                 <a:latin typeface="Calibri" panose="020F0502020204030204" pitchFamily="34" charset="0"/>
               </a:rPr>
-              <a:t>1/1/2018 - 1/31/2018</a:t>
+              <a:t>25 Nov – 2 Dic</a:t>
             </a:r>
-            <a:endParaRPr lang="es-PA" sz="1000" spc="-6">
-              <a:solidFill>
-                <a:srgbClr val="44546A"/>
-              </a:solidFill>
-              <a:latin typeface="Calibri" panose="020F0502020204030204" pitchFamily="34" charset="0"/>
-            </a:endParaRPr>
           </a:p>
         </p:txBody>
       </p:sp>
@@ -23656,13 +23179,13 @@
           <p:cNvSpPr txBox="1"/>
           <p:nvPr>
             <p:custDataLst>
-              <p:tags r:id="rId40"/>
+              <p:tags r:id="rId35"/>
             </p:custDataLst>
           </p:nvPr>
         </p:nvSpPr>
         <p:spPr>
           <a:xfrm>
-            <a:off x="127000" y="3648540"/>
+            <a:off x="838115" y="3062052"/>
             <a:ext cx="457200" cy="170519"/>
           </a:xfrm>
           <a:prstGeom prst="rect">
@@ -23677,7 +23200,7 @@
           <a:lstStyle/>
           <a:p>
             <a:r>
-              <a:rPr lang="es-PA" sz="1100" b="1" spc="-10" smtClean="0">
+              <a:rPr lang="es-PA" sz="1100" b="1" spc="-10" dirty="0">
                 <a:solidFill>
                   <a:schemeClr val="dk2"/>
                 </a:solidFill>
@@ -23685,12 +23208,6 @@
               </a:rPr>
               <a:t>Sprint 1</a:t>
             </a:r>
-            <a:endParaRPr lang="es-PA" sz="1100" b="1" spc="-10">
-              <a:solidFill>
-                <a:schemeClr val="dk2"/>
-              </a:solidFill>
-              <a:latin typeface="Calibri" panose="020F0502020204030204" pitchFamily="34" charset="0"/>
-            </a:endParaRPr>
           </a:p>
         </p:txBody>
       </p:sp>
@@ -23700,20 +23217,23 @@
           <p:cNvSpPr/>
           <p:nvPr>
             <p:custDataLst>
-              <p:tags r:id="rId41"/>
+              <p:tags r:id="rId36"/>
             </p:custDataLst>
           </p:nvPr>
         </p:nvSpPr>
         <p:spPr>
           <a:xfrm>
-            <a:off x="2701782" y="3898900"/>
-            <a:ext cx="1600200" cy="203200"/>
+            <a:off x="3673497" y="3358494"/>
+            <a:ext cx="1343003" cy="138517"/>
           </a:xfrm>
           <a:prstGeom prst="rect">
             <a:avLst/>
           </a:prstGeom>
           <a:solidFill>
-            <a:srgbClr val="ED7D31"/>
+            <a:schemeClr val="accent2">
+              <a:lumMod val="60000"/>
+              <a:lumOff val="40000"/>
+            </a:schemeClr>
           </a:solidFill>
           <a:ln w="12700" cap="flat" cmpd="sng" algn="ctr">
             <a:noFill/>
@@ -23731,28 +23251,6 @@
             <a:bevelT w="165100" h="12700"/>
           </a:sp3d>
           <a:extLst>
-            <a:ext uri="{91240B29-F687-4F45-9708-019B960494DF}">
-              <a14:hiddenLine xmlns:a14="http://schemas.microsoft.com/office/drawing/2010/main" w="12700" cap="flat" cmpd="sng" algn="ctr">
-                <a:solidFill>
-                  <a:schemeClr val="accent1">
-                    <a:shade val="50000"/>
-                  </a:schemeClr>
-                </a:solidFill>
-                <a:prstDash val="solid"/>
-                <a:miter lim="800000"/>
-              </a14:hiddenLine>
-            </a:ext>
-            <a:ext uri="{AF507438-7753-43E0-B8FC-AC1667EBCBE1}">
-              <a14:hiddenEffects xmlns:a14="http://schemas.microsoft.com/office/drawing/2010/main">
-                <a:effectLst>
-                  <a:outerShdw>
-                    <a:scrgbClr r="0" g="0" b="0">
-                      <a:alpha val="50000"/>
-                    </a:scrgbClr>
-                  </a:outerShdw>
-                </a:effectLst>
-              </a14:hiddenEffects>
-            </a:ext>
             <a:ext uri="{53640926-AAD7-44D8-BBD7-CCE9431645EC}">
               <a14:shadowObscured xmlns:a14="http://schemas.microsoft.com/office/drawing/2010/main" val="1"/>
             </a:ext>
@@ -23789,7 +23287,7 @@
           <p:cNvSpPr/>
           <p:nvPr>
             <p:custDataLst>
-              <p:tags r:id="rId42"/>
+              <p:tags r:id="rId37"/>
             </p:custDataLst>
           </p:nvPr>
         </p:nvSpPr>
@@ -23833,7 +23331,7 @@
           <p:cNvSpPr txBox="1"/>
           <p:nvPr>
             <p:custDataLst>
-              <p:tags r:id="rId43"/>
+              <p:tags r:id="rId38"/>
             </p:custDataLst>
           </p:nvPr>
         </p:nvSpPr>
@@ -23855,7 +23353,7 @@
           <a:p>
             <a:pPr algn="ctr"/>
             <a:r>
-              <a:rPr lang="es-PA" sz="1000" smtClean="0">
+              <a:rPr lang="es-PA" sz="1000">
                 <a:solidFill>
                   <a:srgbClr val="ED7D31"/>
                 </a:solidFill>
@@ -23863,12 +23361,6 @@
               </a:rPr>
               <a:t>28 días</a:t>
             </a:r>
-            <a:endParaRPr lang="es-PA" sz="1000">
-              <a:solidFill>
-                <a:srgbClr val="ED7D31"/>
-              </a:solidFill>
-              <a:latin typeface="Calibri" panose="020F0502020204030204" pitchFamily="34" charset="0"/>
-            </a:endParaRPr>
           </a:p>
         </p:txBody>
       </p:sp>
@@ -23878,7 +23370,7 @@
           <p:cNvSpPr txBox="1"/>
           <p:nvPr>
             <p:custDataLst>
-              <p:tags r:id="rId44"/>
+              <p:tags r:id="rId39"/>
             </p:custDataLst>
           </p:nvPr>
         </p:nvSpPr>
@@ -23914,7 +23406,7 @@
           <p:cNvSpPr txBox="1"/>
           <p:nvPr>
             <p:custDataLst>
-              <p:tags r:id="rId45"/>
+              <p:tags r:id="rId40"/>
             </p:custDataLst>
           </p:nvPr>
         </p:nvSpPr>
@@ -23950,7 +23442,7 @@
           <p:cNvSpPr txBox="1"/>
           <p:nvPr>
             <p:custDataLst>
-              <p:tags r:id="rId46"/>
+              <p:tags r:id="rId41"/>
             </p:custDataLst>
           </p:nvPr>
         </p:nvSpPr>
@@ -23986,14 +23478,14 @@
           <p:cNvSpPr txBox="1"/>
           <p:nvPr>
             <p:custDataLst>
-              <p:tags r:id="rId47"/>
+              <p:tags r:id="rId42"/>
             </p:custDataLst>
           </p:nvPr>
         </p:nvSpPr>
         <p:spPr>
           <a:xfrm>
-            <a:off x="4349821" y="3922988"/>
-            <a:ext cx="1130300" cy="155025"/>
+            <a:off x="5216786" y="3370450"/>
+            <a:ext cx="1130300" cy="153888"/>
           </a:xfrm>
           <a:prstGeom prst="rect">
             <a:avLst/>
@@ -24007,20 +23499,14 @@
           <a:lstStyle/>
           <a:p>
             <a:r>
-              <a:rPr lang="es-PA" sz="1000" spc="-6" smtClean="0">
+              <a:rPr lang="es-PA" sz="1000" spc="-6" dirty="0">
                 <a:solidFill>
                   <a:srgbClr val="44546A"/>
                 </a:solidFill>
                 <a:latin typeface="Calibri" panose="020F0502020204030204" pitchFamily="34" charset="0"/>
               </a:rPr>
-              <a:t>2/1/2018 - 2/28/2018</a:t>
+              <a:t>3 Dic – 13 Dic</a:t>
             </a:r>
-            <a:endParaRPr lang="es-PA" sz="1000" spc="-6">
-              <a:solidFill>
-                <a:srgbClr val="44546A"/>
-              </a:solidFill>
-              <a:latin typeface="Calibri" panose="020F0502020204030204" pitchFamily="34" charset="0"/>
-            </a:endParaRPr>
           </a:p>
         </p:txBody>
       </p:sp>
@@ -24030,13 +23516,13 @@
           <p:cNvSpPr txBox="1"/>
           <p:nvPr>
             <p:custDataLst>
-              <p:tags r:id="rId48"/>
+              <p:tags r:id="rId43"/>
             </p:custDataLst>
           </p:nvPr>
         </p:nvSpPr>
         <p:spPr>
           <a:xfrm>
-            <a:off x="127000" y="3915240"/>
+            <a:off x="838115" y="3312693"/>
             <a:ext cx="457200" cy="170519"/>
           </a:xfrm>
           <a:prstGeom prst="rect">
@@ -24051,7 +23537,7 @@
           <a:lstStyle/>
           <a:p>
             <a:r>
-              <a:rPr lang="es-PA" sz="1100" b="1" spc="-10" smtClean="0">
+              <a:rPr lang="es-PA" sz="1100" b="1" spc="-10" dirty="0">
                 <a:solidFill>
                   <a:schemeClr val="dk2"/>
                 </a:solidFill>
@@ -24059,12 +23545,6 @@
               </a:rPr>
               <a:t>Sprint 2</a:t>
             </a:r>
-            <a:endParaRPr lang="es-PA" sz="1100" b="1" spc="-10">
-              <a:solidFill>
-                <a:schemeClr val="dk2"/>
-              </a:solidFill>
-              <a:latin typeface="Calibri" panose="020F0502020204030204" pitchFamily="34" charset="0"/>
-            </a:endParaRPr>
           </a:p>
         </p:txBody>
       </p:sp>
@@ -24074,20 +23554,23 @@
           <p:cNvSpPr/>
           <p:nvPr>
             <p:custDataLst>
-              <p:tags r:id="rId49"/>
+              <p:tags r:id="rId44"/>
             </p:custDataLst>
           </p:nvPr>
         </p:nvSpPr>
         <p:spPr>
           <a:xfrm>
-            <a:off x="4299061" y="4165600"/>
-            <a:ext cx="1714500" cy="203200"/>
+            <a:off x="5029483" y="3598558"/>
+            <a:ext cx="1343003" cy="124203"/>
           </a:xfrm>
           <a:prstGeom prst="rect">
             <a:avLst/>
           </a:prstGeom>
           <a:solidFill>
-            <a:srgbClr val="FFC000"/>
+            <a:schemeClr val="accent4">
+              <a:lumMod val="60000"/>
+              <a:lumOff val="40000"/>
+            </a:schemeClr>
           </a:solidFill>
           <a:ln w="12700" cap="flat" cmpd="sng" algn="ctr">
             <a:noFill/>
@@ -24105,28 +23588,6 @@
             <a:bevelT w="165100" h="12700"/>
           </a:sp3d>
           <a:extLst>
-            <a:ext uri="{91240B29-F687-4F45-9708-019B960494DF}">
-              <a14:hiddenLine xmlns:a14="http://schemas.microsoft.com/office/drawing/2010/main" w="12700" cap="flat" cmpd="sng" algn="ctr">
-                <a:solidFill>
-                  <a:schemeClr val="accent1">
-                    <a:shade val="50000"/>
-                  </a:schemeClr>
-                </a:solidFill>
-                <a:prstDash val="solid"/>
-                <a:miter lim="800000"/>
-              </a14:hiddenLine>
-            </a:ext>
-            <a:ext uri="{AF507438-7753-43E0-B8FC-AC1667EBCBE1}">
-              <a14:hiddenEffects xmlns:a14="http://schemas.microsoft.com/office/drawing/2010/main">
-                <a:effectLst>
-                  <a:outerShdw>
-                    <a:scrgbClr r="0" g="0" b="0">
-                      <a:alpha val="50000"/>
-                    </a:scrgbClr>
-                  </a:outerShdw>
-                </a:effectLst>
-              </a14:hiddenEffects>
-            </a:ext>
             <a:ext uri="{53640926-AAD7-44D8-BBD7-CCE9431645EC}">
               <a14:shadowObscured xmlns:a14="http://schemas.microsoft.com/office/drawing/2010/main" val="1"/>
             </a:ext>
@@ -24163,7 +23624,7 @@
           <p:cNvSpPr/>
           <p:nvPr>
             <p:custDataLst>
-              <p:tags r:id="rId50"/>
+              <p:tags r:id="rId45"/>
             </p:custDataLst>
           </p:nvPr>
         </p:nvSpPr>
@@ -24207,7 +23668,7 @@
           <p:cNvSpPr txBox="1"/>
           <p:nvPr>
             <p:custDataLst>
-              <p:tags r:id="rId51"/>
+              <p:tags r:id="rId46"/>
             </p:custDataLst>
           </p:nvPr>
         </p:nvSpPr>
@@ -24229,7 +23690,7 @@
           <a:p>
             <a:pPr algn="ctr"/>
             <a:r>
-              <a:rPr lang="es-PA" sz="1000" smtClean="0">
+              <a:rPr lang="es-PA" sz="1000">
                 <a:solidFill>
                   <a:srgbClr val="ED7D31"/>
                 </a:solidFill>
@@ -24237,12 +23698,6 @@
               </a:rPr>
               <a:t>30 días</a:t>
             </a:r>
-            <a:endParaRPr lang="es-PA" sz="1000">
-              <a:solidFill>
-                <a:srgbClr val="ED7D31"/>
-              </a:solidFill>
-              <a:latin typeface="Calibri" panose="020F0502020204030204" pitchFamily="34" charset="0"/>
-            </a:endParaRPr>
           </a:p>
         </p:txBody>
       </p:sp>
@@ -24252,7 +23707,7 @@
           <p:cNvSpPr txBox="1"/>
           <p:nvPr>
             <p:custDataLst>
-              <p:tags r:id="rId52"/>
+              <p:tags r:id="rId47"/>
             </p:custDataLst>
           </p:nvPr>
         </p:nvSpPr>
@@ -24288,7 +23743,7 @@
           <p:cNvSpPr txBox="1"/>
           <p:nvPr>
             <p:custDataLst>
-              <p:tags r:id="rId53"/>
+              <p:tags r:id="rId48"/>
             </p:custDataLst>
           </p:nvPr>
         </p:nvSpPr>
@@ -24324,7 +23779,7 @@
           <p:cNvSpPr txBox="1"/>
           <p:nvPr>
             <p:custDataLst>
-              <p:tags r:id="rId54"/>
+              <p:tags r:id="rId49"/>
             </p:custDataLst>
           </p:nvPr>
         </p:nvSpPr>
@@ -24360,13 +23815,13 @@
           <p:cNvSpPr txBox="1"/>
           <p:nvPr>
             <p:custDataLst>
-              <p:tags r:id="rId55"/>
+              <p:tags r:id="rId50"/>
             </p:custDataLst>
           </p:nvPr>
         </p:nvSpPr>
         <p:spPr>
           <a:xfrm>
-            <a:off x="6061192" y="4189688"/>
+            <a:off x="6462345" y="3583146"/>
             <a:ext cx="1130300" cy="155025"/>
           </a:xfrm>
           <a:prstGeom prst="rect">
@@ -24381,20 +23836,14 @@
           <a:lstStyle/>
           <a:p>
             <a:r>
-              <a:rPr lang="es-PA" sz="1000" spc="-6" smtClean="0">
+              <a:rPr lang="es-PA" sz="1000" spc="-6" dirty="0">
                 <a:solidFill>
                   <a:srgbClr val="44546A"/>
                 </a:solidFill>
                 <a:latin typeface="Calibri" panose="020F0502020204030204" pitchFamily="34" charset="0"/>
               </a:rPr>
-              <a:t>3/1/2018 - 3/30/2018</a:t>
+              <a:t>14 Dic – 29 Dic</a:t>
             </a:r>
-            <a:endParaRPr lang="es-PA" sz="1000" spc="-6">
-              <a:solidFill>
-                <a:srgbClr val="44546A"/>
-              </a:solidFill>
-              <a:latin typeface="Calibri" panose="020F0502020204030204" pitchFamily="34" charset="0"/>
-            </a:endParaRPr>
           </a:p>
         </p:txBody>
       </p:sp>
@@ -24404,13 +23853,13 @@
           <p:cNvSpPr txBox="1"/>
           <p:nvPr>
             <p:custDataLst>
-              <p:tags r:id="rId56"/>
+              <p:tags r:id="rId51"/>
             </p:custDataLst>
           </p:nvPr>
         </p:nvSpPr>
         <p:spPr>
           <a:xfrm>
-            <a:off x="127000" y="4181940"/>
+            <a:off x="838115" y="3581496"/>
             <a:ext cx="457200" cy="170519"/>
           </a:xfrm>
           <a:prstGeom prst="rect">
@@ -24425,7 +23874,7 @@
           <a:lstStyle/>
           <a:p>
             <a:r>
-              <a:rPr lang="es-PA" sz="1100" b="1" spc="-10" smtClean="0">
+              <a:rPr lang="es-PA" sz="1100" b="1" spc="-10" dirty="0">
                 <a:solidFill>
                   <a:schemeClr val="dk2"/>
                 </a:solidFill>
@@ -24433,12 +23882,6 @@
               </a:rPr>
               <a:t>Sprint 3</a:t>
             </a:r>
-            <a:endParaRPr lang="es-PA" sz="1100" b="1" spc="-10">
-              <a:solidFill>
-                <a:schemeClr val="dk2"/>
-              </a:solidFill>
-              <a:latin typeface="Calibri" panose="020F0502020204030204" pitchFamily="34" charset="0"/>
-            </a:endParaRPr>
           </a:p>
         </p:txBody>
       </p:sp>
@@ -24448,14 +23891,14 @@
           <p:cNvSpPr/>
           <p:nvPr>
             <p:custDataLst>
-              <p:tags r:id="rId57"/>
+              <p:tags r:id="rId52"/>
             </p:custDataLst>
           </p:nvPr>
         </p:nvSpPr>
         <p:spPr>
           <a:xfrm>
-            <a:off x="6124523" y="4432300"/>
-            <a:ext cx="1663700" cy="203200"/>
+            <a:off x="6462345" y="3855106"/>
+            <a:ext cx="1970455" cy="134523"/>
           </a:xfrm>
           <a:prstGeom prst="rect">
             <a:avLst/>
@@ -24537,7 +23980,7 @@
           <p:cNvSpPr/>
           <p:nvPr>
             <p:custDataLst>
-              <p:tags r:id="rId58"/>
+              <p:tags r:id="rId53"/>
             </p:custDataLst>
           </p:nvPr>
         </p:nvSpPr>
@@ -24581,7 +24024,7 @@
           <p:cNvSpPr txBox="1"/>
           <p:nvPr>
             <p:custDataLst>
-              <p:tags r:id="rId59"/>
+              <p:tags r:id="rId54"/>
             </p:custDataLst>
           </p:nvPr>
         </p:nvSpPr>
@@ -24603,7 +24046,7 @@
           <a:p>
             <a:pPr algn="ctr"/>
             <a:r>
-              <a:rPr lang="es-PA" sz="1000" smtClean="0">
+              <a:rPr lang="es-PA" sz="1000">
                 <a:solidFill>
                   <a:srgbClr val="ED7D31"/>
                 </a:solidFill>
@@ -24611,12 +24054,6 @@
               </a:rPr>
               <a:t>29 días</a:t>
             </a:r>
-            <a:endParaRPr lang="es-PA" sz="1000">
-              <a:solidFill>
-                <a:srgbClr val="ED7D31"/>
-              </a:solidFill>
-              <a:latin typeface="Calibri" panose="020F0502020204030204" pitchFamily="34" charset="0"/>
-            </a:endParaRPr>
           </a:p>
         </p:txBody>
       </p:sp>
@@ -24626,7 +24063,7 @@
           <p:cNvSpPr txBox="1"/>
           <p:nvPr>
             <p:custDataLst>
-              <p:tags r:id="rId60"/>
+              <p:tags r:id="rId55"/>
             </p:custDataLst>
           </p:nvPr>
         </p:nvSpPr>
@@ -24662,7 +24099,7 @@
           <p:cNvSpPr txBox="1"/>
           <p:nvPr>
             <p:custDataLst>
-              <p:tags r:id="rId61"/>
+              <p:tags r:id="rId56"/>
             </p:custDataLst>
           </p:nvPr>
         </p:nvSpPr>
@@ -24698,7 +24135,7 @@
           <p:cNvSpPr txBox="1"/>
           <p:nvPr>
             <p:custDataLst>
-              <p:tags r:id="rId62"/>
+              <p:tags r:id="rId57"/>
             </p:custDataLst>
           </p:nvPr>
         </p:nvSpPr>
@@ -24734,13 +24171,13 @@
           <p:cNvSpPr txBox="1"/>
           <p:nvPr>
             <p:custDataLst>
-              <p:tags r:id="rId63"/>
+              <p:tags r:id="rId58"/>
             </p:custDataLst>
           </p:nvPr>
         </p:nvSpPr>
         <p:spPr>
           <a:xfrm>
-            <a:off x="7829609" y="4456388"/>
+            <a:off x="8577049" y="3819406"/>
             <a:ext cx="1130300" cy="155025"/>
           </a:xfrm>
           <a:prstGeom prst="rect">
@@ -24755,20 +24192,14 @@
           <a:lstStyle/>
           <a:p>
             <a:r>
-              <a:rPr lang="es-PA" sz="1000" spc="-6" smtClean="0">
+              <a:rPr lang="es-PA" sz="1000" spc="-6" dirty="0">
                 <a:solidFill>
                   <a:srgbClr val="44546A"/>
                 </a:solidFill>
                 <a:latin typeface="Calibri" panose="020F0502020204030204" pitchFamily="34" charset="0"/>
               </a:rPr>
-              <a:t>4/2/2018 - 4/30/2018</a:t>
+              <a:t>4 Ene – 19 Ene</a:t>
             </a:r>
-            <a:endParaRPr lang="es-PA" sz="1000" spc="-6">
-              <a:solidFill>
-                <a:srgbClr val="44546A"/>
-              </a:solidFill>
-              <a:latin typeface="Calibri" panose="020F0502020204030204" pitchFamily="34" charset="0"/>
-            </a:endParaRPr>
           </a:p>
         </p:txBody>
       </p:sp>
@@ -24778,13 +24209,13 @@
           <p:cNvSpPr txBox="1"/>
           <p:nvPr>
             <p:custDataLst>
-              <p:tags r:id="rId64"/>
+              <p:tags r:id="rId59"/>
             </p:custDataLst>
           </p:nvPr>
         </p:nvSpPr>
         <p:spPr>
           <a:xfrm>
-            <a:off x="127000" y="4448640"/>
+            <a:off x="838115" y="3819406"/>
             <a:ext cx="457200" cy="170519"/>
           </a:xfrm>
           <a:prstGeom prst="rect">
@@ -24799,7 +24230,7 @@
           <a:lstStyle/>
           <a:p>
             <a:r>
-              <a:rPr lang="es-PA" sz="1100" b="1" spc="-10" smtClean="0">
+              <a:rPr lang="es-PA" sz="1100" b="1" spc="-10" dirty="0">
                 <a:solidFill>
                   <a:schemeClr val="dk2"/>
                 </a:solidFill>
@@ -24807,12 +24238,6 @@
               </a:rPr>
               <a:t>Sprint 4</a:t>
             </a:r>
-            <a:endParaRPr lang="es-PA" sz="1100" b="1" spc="-10">
-              <a:solidFill>
-                <a:schemeClr val="dk2"/>
-              </a:solidFill>
-              <a:latin typeface="Calibri" panose="020F0502020204030204" pitchFamily="34" charset="0"/>
-            </a:endParaRPr>
           </a:p>
         </p:txBody>
       </p:sp>
@@ -24822,20 +24247,20 @@
           <p:cNvSpPr/>
           <p:nvPr>
             <p:custDataLst>
-              <p:tags r:id="rId65"/>
+              <p:tags r:id="rId60"/>
             </p:custDataLst>
           </p:nvPr>
         </p:nvSpPr>
         <p:spPr>
           <a:xfrm>
-            <a:off x="7778848" y="4699000"/>
-            <a:ext cx="1778000" cy="203200"/>
+            <a:off x="8443290" y="4104334"/>
+            <a:ext cx="2099213" cy="115706"/>
           </a:xfrm>
           <a:prstGeom prst="rect">
             <a:avLst/>
           </a:prstGeom>
           <a:solidFill>
-            <a:srgbClr val="6F3198"/>
+            <a:srgbClr val="00B050"/>
           </a:solidFill>
           <a:ln w="12700" cap="flat" cmpd="sng" algn="ctr">
             <a:noFill/>
@@ -24853,28 +24278,6 @@
             <a:bevelT w="165100" h="12700"/>
           </a:sp3d>
           <a:extLst>
-            <a:ext uri="{91240B29-F687-4F45-9708-019B960494DF}">
-              <a14:hiddenLine xmlns:a14="http://schemas.microsoft.com/office/drawing/2010/main" w="12700" cap="flat" cmpd="sng" algn="ctr">
-                <a:solidFill>
-                  <a:schemeClr val="accent1">
-                    <a:shade val="50000"/>
-                  </a:schemeClr>
-                </a:solidFill>
-                <a:prstDash val="solid"/>
-                <a:miter lim="800000"/>
-              </a14:hiddenLine>
-            </a:ext>
-            <a:ext uri="{AF507438-7753-43E0-B8FC-AC1667EBCBE1}">
-              <a14:hiddenEffects xmlns:a14="http://schemas.microsoft.com/office/drawing/2010/main">
-                <a:effectLst>
-                  <a:outerShdw>
-                    <a:scrgbClr r="0" g="0" b="0">
-                      <a:alpha val="50000"/>
-                    </a:scrgbClr>
-                  </a:outerShdw>
-                </a:effectLst>
-              </a14:hiddenEffects>
-            </a:ext>
             <a:ext uri="{53640926-AAD7-44D8-BBD7-CCE9431645EC}">
               <a14:shadowObscured xmlns:a14="http://schemas.microsoft.com/office/drawing/2010/main" val="1"/>
             </a:ext>
@@ -24911,7 +24314,7 @@
           <p:cNvSpPr/>
           <p:nvPr>
             <p:custDataLst>
-              <p:tags r:id="rId66"/>
+              <p:tags r:id="rId61"/>
             </p:custDataLst>
           </p:nvPr>
         </p:nvSpPr>
@@ -24955,7 +24358,7 @@
           <p:cNvSpPr txBox="1"/>
           <p:nvPr>
             <p:custDataLst>
-              <p:tags r:id="rId67"/>
+              <p:tags r:id="rId62"/>
             </p:custDataLst>
           </p:nvPr>
         </p:nvSpPr>
@@ -24977,7 +24380,7 @@
           <a:p>
             <a:pPr algn="ctr"/>
             <a:r>
-              <a:rPr lang="es-PA" sz="1000" smtClean="0">
+              <a:rPr lang="es-PA" sz="1000">
                 <a:solidFill>
                   <a:srgbClr val="ED7D31"/>
                 </a:solidFill>
@@ -24985,12 +24388,6 @@
               </a:rPr>
               <a:t>31 días</a:t>
             </a:r>
-            <a:endParaRPr lang="es-PA" sz="1000">
-              <a:solidFill>
-                <a:srgbClr val="ED7D31"/>
-              </a:solidFill>
-              <a:latin typeface="Calibri" panose="020F0502020204030204" pitchFamily="34" charset="0"/>
-            </a:endParaRPr>
           </a:p>
         </p:txBody>
       </p:sp>
@@ -25000,7 +24397,7 @@
           <p:cNvSpPr txBox="1"/>
           <p:nvPr>
             <p:custDataLst>
-              <p:tags r:id="rId68"/>
+              <p:tags r:id="rId63"/>
             </p:custDataLst>
           </p:nvPr>
         </p:nvSpPr>
@@ -25036,7 +24433,7 @@
           <p:cNvSpPr txBox="1"/>
           <p:nvPr>
             <p:custDataLst>
-              <p:tags r:id="rId69"/>
+              <p:tags r:id="rId64"/>
             </p:custDataLst>
           </p:nvPr>
         </p:nvSpPr>
@@ -25072,7 +24469,7 @@
           <p:cNvSpPr txBox="1"/>
           <p:nvPr>
             <p:custDataLst>
-              <p:tags r:id="rId70"/>
+              <p:tags r:id="rId65"/>
             </p:custDataLst>
           </p:nvPr>
         </p:nvSpPr>
@@ -25108,14 +24505,14 @@
           <p:cNvSpPr txBox="1"/>
           <p:nvPr>
             <p:custDataLst>
-              <p:tags r:id="rId71"/>
+              <p:tags r:id="rId66"/>
             </p:custDataLst>
           </p:nvPr>
         </p:nvSpPr>
         <p:spPr>
           <a:xfrm>
-            <a:off x="9598025" y="4723088"/>
-            <a:ext cx="1130300" cy="155025"/>
+            <a:off x="10583106" y="4177699"/>
+            <a:ext cx="1130300" cy="153888"/>
           </a:xfrm>
           <a:prstGeom prst="rect">
             <a:avLst/>
@@ -25129,20 +24526,14 @@
           <a:lstStyle/>
           <a:p>
             <a:r>
-              <a:rPr lang="es-PA" sz="1000" spc="-6" smtClean="0">
+              <a:rPr lang="es-PA" sz="1000" spc="-6" dirty="0">
                 <a:solidFill>
                   <a:srgbClr val="44546A"/>
                 </a:solidFill>
                 <a:latin typeface="Calibri" panose="020F0502020204030204" pitchFamily="34" charset="0"/>
               </a:rPr>
-              <a:t>5/1/2018 - 5/31/2018</a:t>
+              <a:t>3 Feb -  18 Feb</a:t>
             </a:r>
-            <a:endParaRPr lang="es-PA" sz="1000" spc="-6">
-              <a:solidFill>
-                <a:srgbClr val="44546A"/>
-              </a:solidFill>
-              <a:latin typeface="Calibri" panose="020F0502020204030204" pitchFamily="34" charset="0"/>
-            </a:endParaRPr>
           </a:p>
         </p:txBody>
       </p:sp>
@@ -25152,13 +24543,13 @@
           <p:cNvSpPr txBox="1"/>
           <p:nvPr>
             <p:custDataLst>
-              <p:tags r:id="rId72"/>
+              <p:tags r:id="rId67"/>
             </p:custDataLst>
           </p:nvPr>
         </p:nvSpPr>
         <p:spPr>
           <a:xfrm>
-            <a:off x="127000" y="4715340"/>
+            <a:off x="838115" y="4080433"/>
             <a:ext cx="457200" cy="170519"/>
           </a:xfrm>
           <a:prstGeom prst="rect">
@@ -25173,7 +24564,7 @@
           <a:lstStyle/>
           <a:p>
             <a:r>
-              <a:rPr lang="es-PA" sz="1100" b="1" spc="-10" smtClean="0">
+              <a:rPr lang="es-PA" sz="1100" b="1" spc="-10" dirty="0">
                 <a:solidFill>
                   <a:schemeClr val="dk2"/>
                 </a:solidFill>
@@ -25181,101 +24572,6 @@
               </a:rPr>
               <a:t>Sprint 5</a:t>
             </a:r>
-            <a:endParaRPr lang="es-PA" sz="1100" b="1" spc="-10">
-              <a:solidFill>
-                <a:schemeClr val="dk2"/>
-              </a:solidFill>
-              <a:latin typeface="Calibri" panose="020F0502020204030204" pitchFamily="34" charset="0"/>
-            </a:endParaRPr>
-          </a:p>
-        </p:txBody>
-      </p:sp>
-      <p:sp>
-        <p:nvSpPr>
-          <p:cNvPr id="468" name="OTLSHAPE_T_5fb83712d998486794713810c5f37960_Shape"/>
-          <p:cNvSpPr/>
-          <p:nvPr>
-            <p:custDataLst>
-              <p:tags r:id="rId73"/>
-            </p:custDataLst>
-          </p:nvPr>
-        </p:nvSpPr>
-        <p:spPr>
-          <a:xfrm>
-            <a:off x="9547265" y="5019125"/>
-            <a:ext cx="1663700" cy="203200"/>
-          </a:xfrm>
-          <a:prstGeom prst="rect">
-            <a:avLst/>
-          </a:prstGeom>
-          <a:solidFill>
-            <a:srgbClr val="B20E12"/>
-          </a:solidFill>
-          <a:ln w="12700" cap="flat" cmpd="sng" algn="ctr">
-            <a:noFill/>
-            <a:prstDash val="solid"/>
-            <a:miter lim="800000"/>
-          </a:ln>
-          <a:effectLst/>
-          <a:scene3d>
-            <a:camera prst="orthographicFront"/>
-            <a:lightRig rig="balanced" dir="t">
-              <a:rot lat="0" lon="0" rev="8700000"/>
-            </a:lightRig>
-          </a:scene3d>
-          <a:sp3d>
-            <a:bevelT w="165100" h="12700"/>
-          </a:sp3d>
-          <a:extLst>
-            <a:ext uri="{91240B29-F687-4F45-9708-019B960494DF}">
-              <a14:hiddenLine xmlns:a14="http://schemas.microsoft.com/office/drawing/2010/main" w="12700" cap="flat" cmpd="sng" algn="ctr">
-                <a:solidFill>
-                  <a:schemeClr val="accent1">
-                    <a:shade val="50000"/>
-                  </a:schemeClr>
-                </a:solidFill>
-                <a:prstDash val="solid"/>
-                <a:miter lim="800000"/>
-              </a14:hiddenLine>
-            </a:ext>
-            <a:ext uri="{AF507438-7753-43E0-B8FC-AC1667EBCBE1}">
-              <a14:hiddenEffects xmlns:a14="http://schemas.microsoft.com/office/drawing/2010/main">
-                <a:effectLst>
-                  <a:outerShdw>
-                    <a:scrgbClr r="0" g="0" b="0">
-                      <a:alpha val="50000"/>
-                    </a:scrgbClr>
-                  </a:outerShdw>
-                </a:effectLst>
-              </a14:hiddenEffects>
-            </a:ext>
-            <a:ext uri="{53640926-AAD7-44D8-BBD7-CCE9431645EC}">
-              <a14:shadowObscured xmlns:a14="http://schemas.microsoft.com/office/drawing/2010/main" val="1"/>
-            </a:ext>
-          </a:extLst>
-        </p:spPr>
-        <p:style>
-          <a:lnRef idx="2">
-            <a:schemeClr val="accent1">
-              <a:shade val="50000"/>
-            </a:schemeClr>
-          </a:lnRef>
-          <a:fillRef idx="1">
-            <a:schemeClr val="accent1"/>
-          </a:fillRef>
-          <a:effectRef idx="0">
-            <a:schemeClr val="accent1"/>
-          </a:effectRef>
-          <a:fontRef idx="minor">
-            <a:schemeClr val="lt1"/>
-          </a:fontRef>
-        </p:style>
-        <p:txBody>
-          <a:bodyPr rtlCol="0" anchor="ctr"/>
-          <a:lstStyle/>
-          <a:p>
-            <a:pPr algn="ctr"/>
-            <a:endParaRPr lang="es-PA"/>
           </a:p>
         </p:txBody>
       </p:sp>
@@ -25285,7 +24581,7 @@
           <p:cNvSpPr/>
           <p:nvPr>
             <p:custDataLst>
-              <p:tags r:id="rId74"/>
+              <p:tags r:id="rId68"/>
             </p:custDataLst>
           </p:nvPr>
         </p:nvSpPr>
@@ -25329,7 +24625,7 @@
           <p:cNvSpPr txBox="1"/>
           <p:nvPr>
             <p:custDataLst>
-              <p:tags r:id="rId75"/>
+              <p:tags r:id="rId69"/>
             </p:custDataLst>
           </p:nvPr>
         </p:nvSpPr>
@@ -25351,7 +24647,7 @@
           <a:p>
             <a:pPr algn="ctr"/>
             <a:r>
-              <a:rPr lang="es-PA" sz="1000" smtClean="0">
+              <a:rPr lang="es-PA" sz="1000">
                 <a:solidFill>
                   <a:srgbClr val="ED7D31"/>
                 </a:solidFill>
@@ -25359,12 +24655,6 @@
               </a:rPr>
               <a:t>29 días</a:t>
             </a:r>
-            <a:endParaRPr lang="es-PA" sz="1000">
-              <a:solidFill>
-                <a:srgbClr val="ED7D31"/>
-              </a:solidFill>
-              <a:latin typeface="Calibri" panose="020F0502020204030204" pitchFamily="34" charset="0"/>
-            </a:endParaRPr>
           </a:p>
         </p:txBody>
       </p:sp>
@@ -25374,7 +24664,7 @@
           <p:cNvSpPr txBox="1"/>
           <p:nvPr>
             <p:custDataLst>
-              <p:tags r:id="rId76"/>
+              <p:tags r:id="rId70"/>
             </p:custDataLst>
           </p:nvPr>
         </p:nvSpPr>
@@ -25410,7 +24700,7 @@
           <p:cNvSpPr txBox="1"/>
           <p:nvPr>
             <p:custDataLst>
-              <p:tags r:id="rId77"/>
+              <p:tags r:id="rId71"/>
             </p:custDataLst>
           </p:nvPr>
         </p:nvSpPr>
@@ -25446,7 +24736,7 @@
           <p:cNvSpPr txBox="1"/>
           <p:nvPr>
             <p:custDataLst>
-              <p:tags r:id="rId78"/>
+              <p:tags r:id="rId72"/>
             </p:custDataLst>
           </p:nvPr>
         </p:nvSpPr>
@@ -25478,101 +24768,13 @@
       </p:sp>
       <p:sp>
         <p:nvSpPr>
-          <p:cNvPr id="474" name="OTLSHAPE_T_5fb83712d998486794713810c5f37960_JoinedDate"/>
-          <p:cNvSpPr txBox="1"/>
-          <p:nvPr>
-            <p:custDataLst>
-              <p:tags r:id="rId79"/>
-            </p:custDataLst>
-          </p:nvPr>
-        </p:nvSpPr>
-        <p:spPr>
-          <a:xfrm>
-            <a:off x="11252350" y="4965700"/>
-            <a:ext cx="584200" cy="310049"/>
-          </a:xfrm>
-          <a:prstGeom prst="rect">
-            <a:avLst/>
-          </a:prstGeom>
-          <a:noFill/>
-        </p:spPr>
-        <p:txBody>
-          <a:bodyPr vert="horz" wrap="square" lIns="0" tIns="0" rIns="0" bIns="0" rtlCol="0" anchor="ctr" anchorCtr="0">
-            <a:spAutoFit/>
-          </a:bodyPr>
-          <a:lstStyle/>
-          <a:p>
-            <a:r>
-              <a:rPr lang="es-PA" sz="1000" smtClean="0">
-                <a:solidFill>
-                  <a:srgbClr val="44546A"/>
-                </a:solidFill>
-                <a:latin typeface="Calibri" panose="020F0502020204030204" pitchFamily="34" charset="0"/>
-              </a:rPr>
-              <a:t>6/1/2018 - 6/29/2018</a:t>
-            </a:r>
-            <a:endParaRPr lang="es-PA" sz="1000">
-              <a:solidFill>
-                <a:srgbClr val="44546A"/>
-              </a:solidFill>
-              <a:latin typeface="Calibri" panose="020F0502020204030204" pitchFamily="34" charset="0"/>
-            </a:endParaRPr>
-          </a:p>
-        </p:txBody>
-      </p:sp>
-      <p:sp>
-        <p:nvSpPr>
-          <p:cNvPr id="475" name="OTLSHAPE_T_5fb83712d998486794713810c5f37960_Title"/>
-          <p:cNvSpPr txBox="1"/>
-          <p:nvPr>
-            <p:custDataLst>
-              <p:tags r:id="rId80"/>
-            </p:custDataLst>
-          </p:nvPr>
-        </p:nvSpPr>
-        <p:spPr>
-          <a:xfrm>
-            <a:off x="127000" y="5035466"/>
-            <a:ext cx="457200" cy="170519"/>
-          </a:xfrm>
-          <a:prstGeom prst="rect">
-            <a:avLst/>
-          </a:prstGeom>
-          <a:noFill/>
-        </p:spPr>
-        <p:txBody>
-          <a:bodyPr vert="horz" wrap="square" lIns="0" tIns="0" rIns="0" bIns="0" rtlCol="0" anchor="ctr" anchorCtr="0">
-            <a:spAutoFit/>
-          </a:bodyPr>
-          <a:lstStyle/>
-          <a:p>
-            <a:r>
-              <a:rPr lang="es-PA" sz="1100" b="1" spc="-10" smtClean="0">
-                <a:solidFill>
-                  <a:schemeClr val="dk2"/>
-                </a:solidFill>
-                <a:latin typeface="Calibri" panose="020F0502020204030204" pitchFamily="34" charset="0"/>
-              </a:rPr>
-              <a:t>Sprint 6</a:t>
-            </a:r>
-            <a:endParaRPr lang="es-PA" sz="1100" b="1" spc="-10">
-              <a:solidFill>
-                <a:schemeClr val="dk2"/>
-              </a:solidFill>
-              <a:latin typeface="Calibri" panose="020F0502020204030204" pitchFamily="34" charset="0"/>
-            </a:endParaRPr>
-          </a:p>
-        </p:txBody>
-      </p:sp>
-      <p:sp>
-        <p:nvSpPr>
           <p:cNvPr id="2" name="CuadroTexto 1"/>
           <p:cNvSpPr txBox="1"/>
           <p:nvPr/>
         </p:nvSpPr>
         <p:spPr>
           <a:xfrm>
-            <a:off x="811027" y="372382"/>
+            <a:off x="2044186" y="751647"/>
             <a:ext cx="8275599" cy="584775"/>
           </a:xfrm>
           <a:prstGeom prst="rect">
@@ -25587,31 +24789,162 @@
           <a:lstStyle/>
           <a:p>
             <a:r>
-              <a:rPr lang="es-PA" sz="3200" b="1" dirty="0" smtClean="0">
+              <a:rPr lang="es-PA" sz="3200" b="1" dirty="0">
                 <a:solidFill>
-                  <a:schemeClr val="accent1"/>
+                  <a:schemeClr val="accent1">
+                    <a:lumMod val="50000"/>
+                  </a:schemeClr>
                 </a:solidFill>
               </a:rPr>
               <a:t>Planificación de Lanzamiento (Línea de Tiempo)</a:t>
             </a:r>
-            <a:endParaRPr lang="es-PA" sz="3200" b="1" dirty="0">
-              <a:solidFill>
-                <a:schemeClr val="accent1"/>
-              </a:solidFill>
-            </a:endParaRPr>
+          </a:p>
+        </p:txBody>
+      </p:sp>
+      <p:cxnSp>
+        <p:nvCxnSpPr>
+          <p:cNvPr id="83" name="OTLSHAPE_M_6c828a10b5c94eaa8f8b283553ebdb46_Connector1">
+            <a:extLst>
+              <a:ext uri="{FF2B5EF4-FFF2-40B4-BE49-F238E27FC236}">
+                <a16:creationId xmlns:a16="http://schemas.microsoft.com/office/drawing/2014/main" id="{354C0763-A5BB-46A5-B82E-63E053566EFD}"/>
+              </a:ext>
+            </a:extLst>
+          </p:cNvPr>
+          <p:cNvCxnSpPr/>
+          <p:nvPr>
+            <p:custDataLst>
+              <p:tags r:id="rId73"/>
+            </p:custDataLst>
+          </p:nvPr>
+        </p:nvCxnSpPr>
+        <p:spPr>
+          <a:xfrm>
+            <a:off x="10507660" y="2107834"/>
+            <a:ext cx="0" cy="442172"/>
+          </a:xfrm>
+          <a:prstGeom prst="line">
+            <a:avLst/>
+          </a:prstGeom>
+          <a:ln w="9525" cap="flat" cmpd="sng" algn="ctr">
+            <a:solidFill>
+              <a:srgbClr val="1F497E">
+                <a:alpha val="49804"/>
+              </a:srgbClr>
+            </a:solidFill>
+            <a:prstDash val="solid"/>
+            <a:miter lim="800000"/>
+            <a:headEnd type="none" w="med" len="med"/>
+            <a:tailEnd type="none" w="med" len="med"/>
+          </a:ln>
+        </p:spPr>
+        <p:style>
+          <a:lnRef idx="1">
+            <a:schemeClr val="accent1"/>
+          </a:lnRef>
+          <a:fillRef idx="0">
+            <a:schemeClr val="accent1"/>
+          </a:fillRef>
+          <a:effectRef idx="0">
+            <a:schemeClr val="accent1"/>
+          </a:effectRef>
+          <a:fontRef idx="minor">
+            <a:schemeClr val="tx1"/>
+          </a:fontRef>
+        </p:style>
+      </p:cxnSp>
+      <p:sp>
+        <p:nvSpPr>
+          <p:cNvPr id="84" name="OTLSHAPE_M_6c828a10b5c94eaa8f8b283553ebdb46_Shape">
+            <a:extLst>
+              <a:ext uri="{FF2B5EF4-FFF2-40B4-BE49-F238E27FC236}">
+                <a16:creationId xmlns:a16="http://schemas.microsoft.com/office/drawing/2014/main" id="{A16FACA2-406D-4E44-B961-F16417FF1594}"/>
+              </a:ext>
+            </a:extLst>
+          </p:cNvPr>
+          <p:cNvSpPr/>
+          <p:nvPr>
+            <p:custDataLst>
+              <p:tags r:id="rId74"/>
+            </p:custDataLst>
+          </p:nvPr>
+        </p:nvSpPr>
+        <p:spPr>
+          <a:xfrm rot="16200000">
+            <a:off x="10542503" y="2127906"/>
+            <a:ext cx="165100" cy="165100"/>
+          </a:xfrm>
+          <a:prstGeom prst="flowChartMerge">
+            <a:avLst/>
+          </a:prstGeom>
+          <a:solidFill>
+            <a:schemeClr val="accent6">
+              <a:lumMod val="75000"/>
+            </a:schemeClr>
+          </a:solidFill>
+          <a:ln w="12700" cap="flat" cmpd="sng" algn="ctr">
+            <a:noFill/>
+            <a:prstDash val="solid"/>
+            <a:miter lim="800000"/>
+          </a:ln>
+          <a:effectLst/>
+          <a:scene3d>
+            <a:camera prst="orthographicFront"/>
+            <a:lightRig rig="threePt" dir="t"/>
+          </a:scene3d>
+          <a:sp3d>
+            <a:bevelT h="12700"/>
+          </a:sp3d>
+          <a:extLst>
+            <a:ext uri="{53640926-AAD7-44D8-BBD7-CCE9431645EC}">
+              <a14:shadowObscured xmlns:a14="http://schemas.microsoft.com/office/drawing/2010/main" val="1"/>
+            </a:ext>
+          </a:extLst>
+        </p:spPr>
+        <p:style>
+          <a:lnRef idx="2">
+            <a:schemeClr val="accent1">
+              <a:shade val="50000"/>
+            </a:schemeClr>
+          </a:lnRef>
+          <a:fillRef idx="1">
+            <a:schemeClr val="accent1"/>
+          </a:fillRef>
+          <a:effectRef idx="0">
+            <a:schemeClr val="accent1"/>
+          </a:effectRef>
+          <a:fontRef idx="minor">
+            <a:schemeClr val="lt1"/>
+          </a:fontRef>
+        </p:style>
+        <p:txBody>
+          <a:bodyPr rtlCol="0" anchor="ctr"/>
+          <a:lstStyle/>
+          <a:p>
+            <a:pPr algn="ctr"/>
+            <a:endParaRPr lang="es-PA"/>
           </a:p>
         </p:txBody>
       </p:sp>
       <p:sp>
         <p:nvSpPr>
-          <p:cNvPr id="82" name="CuadroTexto 81"/>
+          <p:cNvPr id="85" name="OTLSHAPE_M_6c828a10b5c94eaa8f8b283553ebdb46_Title">
+            <a:extLst>
+              <a:ext uri="{FF2B5EF4-FFF2-40B4-BE49-F238E27FC236}">
+                <a16:creationId xmlns:a16="http://schemas.microsoft.com/office/drawing/2014/main" id="{BBC247DE-FC35-4EED-9252-3BFF2416421A}"/>
+              </a:ext>
+            </a:extLst>
+          </p:cNvPr>
           <p:cNvSpPr txBox="1"/>
-          <p:nvPr/>
+          <p:nvPr>
+            <p:custDataLst>
+              <p:tags r:id="rId75"/>
+            </p:custDataLst>
+          </p:nvPr>
         </p:nvSpPr>
         <p:spPr>
           <a:xfrm>
-            <a:off x="242576" y="6362393"/>
-            <a:ext cx="7796814" cy="369332"/>
+            <a:off x="10752317" y="2107626"/>
+            <a:ext cx="660400" cy="170519"/>
           </a:xfrm>
           <a:prstGeom prst="rect">
             <a:avLst/>
@@ -25619,28 +24952,73 @@
           <a:noFill/>
         </p:spPr>
         <p:txBody>
-          <a:bodyPr wrap="none" rtlCol="0">
+          <a:bodyPr vert="horz" wrap="square" lIns="0" tIns="0" rIns="0" bIns="0" rtlCol="0" anchor="ctr" anchorCtr="0">
             <a:spAutoFit/>
           </a:bodyPr>
           <a:lstStyle/>
           <a:p>
             <a:r>
-              <a:rPr lang="es-PA" dirty="0" smtClean="0"/>
-              <a:t>Puedes utilizar Office </a:t>
+              <a:rPr lang="es-PA" sz="1100" b="1" spc="-8" dirty="0" err="1">
+                <a:solidFill>
+                  <a:schemeClr val="dk2"/>
+                </a:solidFill>
+                <a:latin typeface="Calibri" panose="020F0502020204030204" pitchFamily="34" charset="0"/>
+              </a:rPr>
+              <a:t>Release</a:t>
             </a:r>
             <a:r>
-              <a:rPr lang="es-PA" dirty="0" err="1" smtClean="0"/>
-              <a:t>Timeline</a:t>
+              <a:rPr lang="es-PA" sz="1100" b="1" spc="-8" dirty="0">
+                <a:solidFill>
+                  <a:schemeClr val="dk2"/>
+                </a:solidFill>
+                <a:latin typeface="Calibri" panose="020F0502020204030204" pitchFamily="34" charset="0"/>
+              </a:rPr>
+              <a:t> 3.0</a:t>
             </a:r>
+          </a:p>
+        </p:txBody>
+      </p:sp>
+      <p:sp>
+        <p:nvSpPr>
+          <p:cNvPr id="86" name="OTLSHAPE_M_6c828a10b5c94eaa8f8b283553ebdb46_Date">
+            <a:extLst>
+              <a:ext uri="{FF2B5EF4-FFF2-40B4-BE49-F238E27FC236}">
+                <a16:creationId xmlns:a16="http://schemas.microsoft.com/office/drawing/2014/main" id="{36D6DD6C-1577-479B-9E96-4C046C923092}"/>
+              </a:ext>
+            </a:extLst>
+          </p:cNvPr>
+          <p:cNvSpPr txBox="1"/>
+          <p:nvPr>
+            <p:custDataLst>
+              <p:tags r:id="rId76"/>
+            </p:custDataLst>
+          </p:nvPr>
+        </p:nvSpPr>
+        <p:spPr>
+          <a:xfrm>
+            <a:off x="10752317" y="2312248"/>
+            <a:ext cx="558800" cy="153888"/>
+          </a:xfrm>
+          <a:prstGeom prst="rect">
+            <a:avLst/>
+          </a:prstGeom>
+          <a:noFill/>
+        </p:spPr>
+        <p:txBody>
+          <a:bodyPr vert="horz" wrap="square" lIns="0" tIns="0" rIns="0" bIns="0" rtlCol="0" anchor="ctr" anchorCtr="0">
+            <a:spAutoFit/>
+          </a:bodyPr>
+          <a:lstStyle/>
+          <a:p>
             <a:r>
-              <a:rPr lang="es-PA" dirty="0" smtClean="0"/>
-              <a:t> para crear/editar la </a:t>
+              <a:rPr lang="es-PA" sz="1000" spc="-8" dirty="0">
+                <a:solidFill>
+                  <a:srgbClr val="44546A"/>
+                </a:solidFill>
+                <a:latin typeface="Calibri" panose="020F0502020204030204" pitchFamily="34" charset="0"/>
+              </a:rPr>
+              <a:t>18 Febrero</a:t>
             </a:r>
-            <a:r>
-              <a:rPr lang="es-PA" dirty="0" smtClean="0"/>
-              <a:t>planificación de lanzamiento</a:t>
-            </a:r>
-            <a:endParaRPr lang="es-PA" dirty="0"/>
           </a:p>
         </p:txBody>
       </p:sp>
@@ -25669,13 +25047,6 @@
       </p:transition>
     </mc:Fallback>
   </mc:AlternateContent>
-  <p:timing>
-    <p:tnLst>
-      <p:par>
-        <p:cTn id="1" dur="indefinite" restart="never" nodeType="tmRoot"/>
-      </p:par>
-    </p:tnLst>
-  </p:timing>
 </p:sld>
 </file>
 
@@ -26124,31 +25495,7 @@
 </p:tagLst>
 </file>
 
-<file path=ppt/tags/tag77.xml><?xml version="1.0" encoding="utf-8"?>
-<p:tagLst xmlns:a="http://schemas.openxmlformats.org/drawingml/2006/main" xmlns:r="http://schemas.openxmlformats.org/officeDocument/2006/relationships" xmlns:p="http://schemas.openxmlformats.org/presentationml/2006/main">
-  <p:tag name="OTLMARKERSHAPE" val="OTL"/>
-</p:tagLst>
-</file>
-
-<file path=ppt/tags/tag78.xml><?xml version="1.0" encoding="utf-8"?>
-<p:tagLst xmlns:a="http://schemas.openxmlformats.org/drawingml/2006/main" xmlns:r="http://schemas.openxmlformats.org/officeDocument/2006/relationships" xmlns:p="http://schemas.openxmlformats.org/presentationml/2006/main">
-  <p:tag name="OTLMARKERSHAPE" val="OTL"/>
-</p:tagLst>
-</file>
-
-<file path=ppt/tags/tag79.xml><?xml version="1.0" encoding="utf-8"?>
-<p:tagLst xmlns:a="http://schemas.openxmlformats.org/drawingml/2006/main" xmlns:r="http://schemas.openxmlformats.org/officeDocument/2006/relationships" xmlns:p="http://schemas.openxmlformats.org/presentationml/2006/main">
-  <p:tag name="OTLMARKERSHAPE" val="OTL"/>
-</p:tagLst>
-</file>
-
 <file path=ppt/tags/tag8.xml><?xml version="1.0" encoding="utf-8"?>
-<p:tagLst xmlns:a="http://schemas.openxmlformats.org/drawingml/2006/main" xmlns:r="http://schemas.openxmlformats.org/officeDocument/2006/relationships" xmlns:p="http://schemas.openxmlformats.org/presentationml/2006/main">
-  <p:tag name="OTLMARKERSHAPE" val="OTL"/>
-</p:tagLst>
-</file>
-
-<file path=ppt/tags/tag80.xml><?xml version="1.0" encoding="utf-8"?>
 <p:tagLst xmlns:a="http://schemas.openxmlformats.org/drawingml/2006/main" xmlns:r="http://schemas.openxmlformats.org/officeDocument/2006/relationships" xmlns:p="http://schemas.openxmlformats.org/presentationml/2006/main">
   <p:tag name="OTLMARKERSHAPE" val="OTL"/>
 </p:tagLst>

</xml_diff>